<commit_message>
Completed Capstone - Flatiron School - 04222020
</commit_message>
<xml_diff>
--- a/Capstone_HotelBookingPredition(Final).pptx
+++ b/Capstone_HotelBookingPredition(Final).pptx
@@ -16,7 +16,7 @@
     <p:sldId id="1332" r:id="rId4"/>
     <p:sldId id="1333" r:id="rId5"/>
     <p:sldId id="1366" r:id="rId6"/>
-    <p:sldId id="1367" r:id="rId7"/>
+    <p:sldId id="1380" r:id="rId7"/>
     <p:sldId id="1362" r:id="rId8"/>
     <p:sldId id="1374" r:id="rId9"/>
     <p:sldId id="1375" r:id="rId10"/>
@@ -1090,18 +1090,269 @@
           <a:bodyPr/>
           <a:lstStyle/>
           <a:p>
-            <a:r>
-              <a:rPr lang="en-US" sz="1200" b="0" i="0" kern="1200" dirty="0">
-                <a:solidFill>
-                  <a:schemeClr val="tx1"/>
+            <a:pPr marL="0" marR="0" lvl="0" indent="0" algn="l" defTabSz="914400" rtl="0" eaLnBrk="0" fontAlgn="base" latinLnBrk="0" hangingPunct="0">
+              <a:lnSpc>
+                <a:spcPct val="100000"/>
+              </a:lnSpc>
+              <a:spcBef>
+                <a:spcPct val="30000"/>
+              </a:spcBef>
+              <a:spcAft>
+                <a:spcPct val="0"/>
+              </a:spcAft>
+              <a:buClrTx/>
+              <a:buSzTx/>
+              <a:buFontTx/>
+              <a:buNone/>
+              <a:tabLst/>
+              <a:defRPr/>
+            </a:pPr>
+            <a:r>
+              <a:rPr lang="en-US" kern="1200" dirty="0">
+                <a:solidFill>
+                  <a:schemeClr val="bg1"/>
+                </a:solidFill>
+                <a:latin typeface="Arial" charset="0"/>
+              </a:rPr>
+              <a:t>Capstone</a:t>
+            </a:r>
+            <a:br>
+              <a:rPr lang="en-US" kern="1200" dirty="0">
+                <a:solidFill>
+                  <a:schemeClr val="bg1"/>
+                </a:solidFill>
+                <a:latin typeface="Arial" charset="0"/>
+              </a:rPr>
+            </a:br>
+            <a:r>
+              <a:rPr lang="en-US" kern="1200" dirty="0">
+                <a:solidFill>
+                  <a:schemeClr val="bg1"/>
+                </a:solidFill>
+                <a:latin typeface="Arial" charset="0"/>
+              </a:rPr>
+              <a:t>Hotel Booking Prediction</a:t>
+            </a:r>
+          </a:p>
+          <a:p>
+            <a:pPr marL="0" marR="0" lvl="0" indent="0" algn="l" defTabSz="914400" rtl="0" eaLnBrk="0" fontAlgn="base" latinLnBrk="0" hangingPunct="0">
+              <a:lnSpc>
+                <a:spcPct val="100000"/>
+              </a:lnSpc>
+              <a:spcBef>
+                <a:spcPct val="30000"/>
+              </a:spcBef>
+              <a:spcAft>
+                <a:spcPct val="0"/>
+              </a:spcAft>
+              <a:buClrTx/>
+              <a:buSzTx/>
+              <a:buFontTx/>
+              <a:buNone/>
+              <a:tabLst/>
+              <a:defRPr/>
+            </a:pPr>
+            <a:r>
+              <a:rPr lang="en-US" kern="1200" dirty="0">
+                <a:solidFill>
+                  <a:schemeClr val="bg1"/>
+                </a:solidFill>
+                <a:latin typeface="Arial" charset="0"/>
+              </a:rPr>
+              <a:t>___</a:t>
+            </a:r>
+          </a:p>
+          <a:p>
+            <a:pPr marL="0" marR="0" lvl="0" indent="0" algn="l" defTabSz="914400" rtl="0" eaLnBrk="0" fontAlgn="base" latinLnBrk="0" hangingPunct="0">
+              <a:lnSpc>
+                <a:spcPct val="100000"/>
+              </a:lnSpc>
+              <a:spcBef>
+                <a:spcPct val="30000"/>
+              </a:spcBef>
+              <a:spcAft>
+                <a:spcPct val="0"/>
+              </a:spcAft>
+              <a:buClrTx/>
+              <a:buSzTx/>
+              <a:buFontTx/>
+              <a:buNone/>
+              <a:tabLst/>
+              <a:defRPr/>
+            </a:pPr>
+            <a:endParaRPr kumimoji="0" lang="en-US" sz="1200" b="1" i="0" u="none" strike="noStrike" kern="0" cap="none" spc="0" normalizeH="0" baseline="0" noProof="0" dirty="0">
+              <a:ln>
+                <a:noFill/>
+              </a:ln>
+              <a:solidFill>
+                <a:schemeClr val="accent1"/>
+              </a:solidFill>
+              <a:effectLst/>
+              <a:uLnTx/>
+              <a:uFillTx/>
+              <a:latin typeface="Verdana" pitchFamily="34" charset="0"/>
+              <a:ea typeface="+mn-ea"/>
+              <a:cs typeface="Times New Roman" pitchFamily="18" charset="0"/>
+            </a:endParaRPr>
+          </a:p>
+          <a:p>
+            <a:pPr marL="0" marR="0" lvl="0" indent="0" algn="l" defTabSz="914400" rtl="0" eaLnBrk="0" fontAlgn="base" latinLnBrk="0" hangingPunct="0">
+              <a:lnSpc>
+                <a:spcPct val="100000"/>
+              </a:lnSpc>
+              <a:spcBef>
+                <a:spcPct val="30000"/>
+              </a:spcBef>
+              <a:spcAft>
+                <a:spcPct val="0"/>
+              </a:spcAft>
+              <a:buClrTx/>
+              <a:buSzTx/>
+              <a:buFontTx/>
+              <a:buNone/>
+              <a:tabLst/>
+              <a:defRPr/>
+            </a:pPr>
+            <a:r>
+              <a:rPr kumimoji="0" lang="en-US" sz="1200" b="1" i="0" u="none" strike="noStrike" kern="0" cap="none" spc="0" normalizeH="0" baseline="0" noProof="0" dirty="0">
+                <a:ln>
+                  <a:noFill/>
+                </a:ln>
+                <a:solidFill>
+                  <a:schemeClr val="accent1"/>
                 </a:solidFill>
                 <a:effectLst/>
-                <a:latin typeface="Arial" charset="0"/>
+                <a:uLnTx/>
+                <a:uFillTx/>
+                <a:latin typeface="Verdana" pitchFamily="34" charset="0"/>
                 <a:ea typeface="+mn-ea"/>
-                <a:cs typeface="+mn-cs"/>
-              </a:rPr>
-              <a:t>Predicting if income exceeds $50,000 per year.</a:t>
-            </a:r>
+                <a:cs typeface="Times New Roman" pitchFamily="18" charset="0"/>
+              </a:rPr>
+              <a:t>Presented </a:t>
+            </a:r>
+            <a:r>
+              <a:rPr lang="en-US" sz="1200" b="1" kern="0" dirty="0">
+                <a:solidFill>
+                  <a:schemeClr val="accent1"/>
+                </a:solidFill>
+                <a:latin typeface="Verdana" pitchFamily="34" charset="0"/>
+                <a:cs typeface="Times New Roman" pitchFamily="18" charset="0"/>
+              </a:rPr>
+              <a:t>by: </a:t>
+            </a:r>
+            <a:r>
+              <a:rPr kumimoji="0" lang="en-US" sz="1200" b="1" i="0" u="none" strike="noStrike" kern="0" cap="none" spc="0" normalizeH="0" baseline="0" noProof="0" dirty="0">
+                <a:ln>
+                  <a:noFill/>
+                </a:ln>
+                <a:solidFill>
+                  <a:schemeClr val="accent1"/>
+                </a:solidFill>
+                <a:effectLst/>
+                <a:uLnTx/>
+                <a:uFillTx/>
+                <a:latin typeface="Verdana" pitchFamily="34" charset="0"/>
+                <a:ea typeface="+mn-ea"/>
+                <a:cs typeface="Times New Roman" pitchFamily="18" charset="0"/>
+              </a:rPr>
+              <a:t>Sharonda </a:t>
+            </a:r>
+            <a:r>
+              <a:rPr kumimoji="0" lang="en-US" sz="1200" b="1" i="0" u="none" strike="noStrike" kern="0" cap="none" spc="0" normalizeH="0" baseline="0" noProof="0" dirty="0" err="1">
+                <a:ln>
+                  <a:noFill/>
+                </a:ln>
+                <a:solidFill>
+                  <a:schemeClr val="accent1"/>
+                </a:solidFill>
+                <a:effectLst/>
+                <a:uLnTx/>
+                <a:uFillTx/>
+                <a:latin typeface="Verdana" pitchFamily="34" charset="0"/>
+                <a:ea typeface="+mn-ea"/>
+                <a:cs typeface="Times New Roman" pitchFamily="18" charset="0"/>
+              </a:rPr>
+              <a:t>Petttiett</a:t>
+            </a:r>
+            <a:r>
+              <a:rPr kumimoji="0" lang="en-US" sz="1200" b="1" i="0" u="none" strike="noStrike" kern="0" cap="none" spc="0" normalizeH="0" baseline="0" noProof="0" dirty="0">
+                <a:ln>
+                  <a:noFill/>
+                </a:ln>
+                <a:solidFill>
+                  <a:schemeClr val="accent1"/>
+                </a:solidFill>
+                <a:effectLst/>
+                <a:uLnTx/>
+                <a:uFillTx/>
+                <a:latin typeface="Verdana" pitchFamily="34" charset="0"/>
+                <a:ea typeface="+mn-ea"/>
+                <a:cs typeface="Times New Roman" pitchFamily="18" charset="0"/>
+              </a:rPr>
+              <a:t> – Warner, Student at Flatiron School  (Data Science Program)                                                     </a:t>
+            </a:r>
+          </a:p>
+          <a:p>
+            <a:pPr marL="0" marR="0" lvl="0" indent="0" algn="l" defTabSz="914400" rtl="0" eaLnBrk="0" fontAlgn="base" latinLnBrk="0" hangingPunct="0">
+              <a:lnSpc>
+                <a:spcPct val="100000"/>
+              </a:lnSpc>
+              <a:spcBef>
+                <a:spcPct val="30000"/>
+              </a:spcBef>
+              <a:spcAft>
+                <a:spcPct val="0"/>
+              </a:spcAft>
+              <a:buClrTx/>
+              <a:buSzTx/>
+              <a:buFontTx/>
+              <a:buNone/>
+              <a:tabLst/>
+              <a:defRPr/>
+            </a:pPr>
+            <a:r>
+              <a:rPr kumimoji="0" lang="en-US" sz="1200" b="1" i="0" u="none" strike="noStrike" kern="0" cap="none" spc="0" normalizeH="0" baseline="0" noProof="0" dirty="0">
+                <a:ln>
+                  <a:noFill/>
+                </a:ln>
+                <a:solidFill>
+                  <a:schemeClr val="accent1"/>
+                </a:solidFill>
+                <a:effectLst/>
+                <a:uLnTx/>
+                <a:uFillTx/>
+                <a:latin typeface="Verdana" pitchFamily="34" charset="0"/>
+                <a:ea typeface="+mn-ea"/>
+                <a:cs typeface="Times New Roman" pitchFamily="18" charset="0"/>
+              </a:rPr>
+              <a:t>Date: </a:t>
+            </a:r>
+            <a:r>
+              <a:rPr lang="en-US" sz="1200" b="1" kern="0" dirty="0">
+                <a:solidFill>
+                  <a:schemeClr val="accent1"/>
+                </a:solidFill>
+                <a:latin typeface="Verdana" pitchFamily="34" charset="0"/>
+                <a:cs typeface="Times New Roman" pitchFamily="18" charset="0"/>
+              </a:rPr>
+              <a:t>April 24, 2020</a:t>
+            </a:r>
+            <a:endParaRPr kumimoji="0" lang="en-US" sz="1200" b="1" i="0" u="none" strike="noStrike" kern="0" cap="none" spc="0" normalizeH="0" baseline="0" noProof="0" dirty="0">
+              <a:ln>
+                <a:noFill/>
+              </a:ln>
+              <a:solidFill>
+                <a:schemeClr val="accent1"/>
+              </a:solidFill>
+              <a:effectLst/>
+              <a:uLnTx/>
+              <a:uFillTx/>
+              <a:latin typeface="Arial" charset="0"/>
+              <a:ea typeface="+mn-ea"/>
+              <a:cs typeface="+mn-cs"/>
+            </a:endParaRPr>
+          </a:p>
+          <a:p>
             <a:endParaRPr lang="en-US" dirty="0"/>
           </a:p>
         </p:txBody>
@@ -1823,6 +2074,398 @@
           <a:bodyPr/>
           <a:lstStyle/>
           <a:p>
+            <a:pPr marL="0" marR="0" lvl="0" indent="0" algn="l" defTabSz="914400" rtl="0" eaLnBrk="1" fontAlgn="base" latinLnBrk="0" hangingPunct="1">
+              <a:lnSpc>
+                <a:spcPct val="95000"/>
+              </a:lnSpc>
+              <a:spcBef>
+                <a:spcPct val="25000"/>
+              </a:spcBef>
+              <a:spcAft>
+                <a:spcPct val="0"/>
+              </a:spcAft>
+              <a:buClrTx/>
+              <a:buSzTx/>
+              <a:buFontTx/>
+              <a:buNone/>
+              <a:tabLst/>
+              <a:defRPr/>
+            </a:pPr>
+            <a:r>
+              <a:rPr lang="en-US" sz="1200" b="1" dirty="0" err="1"/>
+              <a:t>RandomForest</a:t>
+            </a:r>
+            <a:r>
+              <a:rPr lang="en-US" sz="1200" b="1" dirty="0"/>
+              <a:t> classifier </a:t>
+            </a:r>
+            <a:r>
+              <a:rPr lang="en-US" sz="1200" b="0" dirty="0"/>
+              <a:t>has an </a:t>
+            </a:r>
+            <a:r>
+              <a:rPr lang="en-US" sz="1200" b="1" dirty="0"/>
+              <a:t>88% </a:t>
+            </a:r>
+            <a:r>
+              <a:rPr lang="en-US" sz="1200" b="0" dirty="0"/>
+              <a:t>accuracy rate for predicting booking cancellations.</a:t>
+            </a:r>
+          </a:p>
+          <a:p>
+            <a:pPr marL="0" marR="0" lvl="0" indent="0" algn="l" defTabSz="914400" rtl="0" eaLnBrk="1" fontAlgn="base" latinLnBrk="0" hangingPunct="1">
+              <a:lnSpc>
+                <a:spcPct val="95000"/>
+              </a:lnSpc>
+              <a:spcBef>
+                <a:spcPct val="25000"/>
+              </a:spcBef>
+              <a:spcAft>
+                <a:spcPct val="0"/>
+              </a:spcAft>
+              <a:buClrTx/>
+              <a:buSzTx/>
+              <a:buFontTx/>
+              <a:buNone/>
+              <a:tabLst/>
+              <a:defRPr/>
+            </a:pPr>
+            <a:endParaRPr lang="en-US" sz="1200" b="0" dirty="0"/>
+          </a:p>
+          <a:p>
+            <a:pPr marL="171450" indent="-171450" eaLnBrk="1" hangingPunct="1">
+              <a:lnSpc>
+                <a:spcPct val="95000"/>
+              </a:lnSpc>
+              <a:spcBef>
+                <a:spcPct val="25000"/>
+              </a:spcBef>
+              <a:buFont typeface="Arial" panose="020B0604020202020204" pitchFamily="34" charset="0"/>
+              <a:buChar char="•"/>
+            </a:pPr>
+            <a:r>
+              <a:rPr lang="en-US" b="1" dirty="0"/>
+              <a:t>ROC_AUC </a:t>
+            </a:r>
+            <a:r>
+              <a:rPr lang="en-US" b="0" dirty="0"/>
+              <a:t>Score: 87% is the </a:t>
+            </a:r>
+            <a:r>
+              <a:rPr lang="en-US" sz="1200" b="0" i="0" kern="1200" dirty="0">
+                <a:solidFill>
+                  <a:schemeClr val="tx1"/>
+                </a:solidFill>
+                <a:effectLst/>
+                <a:latin typeface="Arial" charset="0"/>
+                <a:ea typeface="+mn-ea"/>
+                <a:cs typeface="+mn-cs"/>
+              </a:rPr>
+              <a:t>ROC is a probability curve and AUC represents degree or measure of separability. ... By analogy, Higher the AUC, better the model is at </a:t>
+            </a:r>
+            <a:r>
+              <a:rPr lang="en-US" sz="1200" b="1" i="0" kern="1200" dirty="0">
+                <a:solidFill>
+                  <a:schemeClr val="tx1"/>
+                </a:solidFill>
+                <a:effectLst/>
+                <a:latin typeface="Arial" charset="0"/>
+                <a:ea typeface="+mn-ea"/>
+                <a:cs typeface="+mn-cs"/>
+              </a:rPr>
+              <a:t>distinguishing</a:t>
+            </a:r>
+            <a:r>
+              <a:rPr lang="en-US" sz="1200" b="0" i="0" kern="1200" dirty="0">
+                <a:solidFill>
+                  <a:schemeClr val="tx1"/>
+                </a:solidFill>
+                <a:effectLst/>
+                <a:latin typeface="Arial" charset="0"/>
+                <a:ea typeface="+mn-ea"/>
+                <a:cs typeface="+mn-cs"/>
+              </a:rPr>
+              <a:t> </a:t>
+            </a:r>
+            <a:r>
+              <a:rPr lang="en-US" sz="1200" b="1" i="0" kern="1200" dirty="0">
+                <a:solidFill>
+                  <a:schemeClr val="tx1"/>
+                </a:solidFill>
+                <a:effectLst/>
+                <a:latin typeface="Arial" charset="0"/>
+                <a:ea typeface="+mn-ea"/>
+                <a:cs typeface="+mn-cs"/>
+              </a:rPr>
+              <a:t> between the </a:t>
+            </a:r>
+            <a:r>
+              <a:rPr lang="en-US" sz="1200" b="1" i="0" kern="1200" dirty="0" err="1">
+                <a:solidFill>
+                  <a:schemeClr val="tx1"/>
+                </a:solidFill>
+                <a:effectLst/>
+                <a:latin typeface="Arial" charset="0"/>
+                <a:ea typeface="+mn-ea"/>
+                <a:cs typeface="+mn-cs"/>
+              </a:rPr>
+              <a:t>is_canceled</a:t>
+            </a:r>
+            <a:r>
+              <a:rPr lang="en-US" sz="1200" b="1" i="0" kern="1200" dirty="0">
+                <a:solidFill>
+                  <a:schemeClr val="tx1"/>
+                </a:solidFill>
+                <a:effectLst/>
+                <a:latin typeface="Arial" charset="0"/>
+                <a:ea typeface="+mn-ea"/>
+                <a:cs typeface="+mn-cs"/>
+              </a:rPr>
+              <a:t> class by 87%</a:t>
+            </a:r>
+            <a:r>
+              <a:rPr lang="en-US" sz="1200" b="0" i="0" kern="1200" dirty="0">
+                <a:solidFill>
+                  <a:schemeClr val="tx1"/>
+                </a:solidFill>
+                <a:effectLst/>
+                <a:latin typeface="Arial" charset="0"/>
+                <a:ea typeface="+mn-ea"/>
+                <a:cs typeface="+mn-cs"/>
+              </a:rPr>
+              <a:t>. The ROC curve is plotted with TPR against the FPR where TPR is on y-axis and FPR is on the x-axis.</a:t>
+            </a:r>
+            <a:endParaRPr lang="en-US" b="0" dirty="0"/>
+          </a:p>
+          <a:p>
+            <a:pPr marL="171450" indent="-171450">
+              <a:buFont typeface="Arial" panose="020B0604020202020204" pitchFamily="34" charset="0"/>
+              <a:buChar char="•"/>
+            </a:pPr>
+            <a:r>
+              <a:rPr lang="en-US" sz="1200" b="1" i="0" kern="1200" dirty="0">
+                <a:solidFill>
+                  <a:schemeClr val="tx1"/>
+                </a:solidFill>
+                <a:effectLst/>
+                <a:latin typeface="Arial" charset="0"/>
+                <a:ea typeface="+mn-ea"/>
+                <a:cs typeface="+mn-cs"/>
+              </a:rPr>
+              <a:t>Accuracy</a:t>
+            </a:r>
+            <a:r>
+              <a:rPr lang="en-US" sz="1200" b="0" i="0" kern="1200" dirty="0">
+                <a:solidFill>
+                  <a:schemeClr val="tx1"/>
+                </a:solidFill>
+                <a:effectLst/>
+                <a:latin typeface="Arial" charset="0"/>
+                <a:ea typeface="+mn-ea"/>
+                <a:cs typeface="+mn-cs"/>
+              </a:rPr>
+              <a:t> Score: 0.8776766335158249 is the accuracy of the prediction model.</a:t>
+            </a:r>
+          </a:p>
+          <a:p>
+            <a:pPr marL="171450" indent="-171450">
+              <a:buFont typeface="Arial" panose="020B0604020202020204" pitchFamily="34" charset="0"/>
+              <a:buChar char="•"/>
+            </a:pPr>
+            <a:r>
+              <a:rPr lang="en-US" sz="1200" b="1" i="0" kern="1200" dirty="0">
+                <a:solidFill>
+                  <a:schemeClr val="tx1"/>
+                </a:solidFill>
+                <a:effectLst/>
+                <a:latin typeface="Arial" charset="0"/>
+                <a:ea typeface="+mn-ea"/>
+                <a:cs typeface="+mn-cs"/>
+              </a:rPr>
+              <a:t>Precision</a:t>
+            </a:r>
+            <a:r>
+              <a:rPr lang="en-US" sz="1200" b="0" i="0" kern="1200" dirty="0">
+                <a:solidFill>
+                  <a:schemeClr val="tx1"/>
+                </a:solidFill>
+                <a:effectLst/>
+                <a:latin typeface="Arial" charset="0"/>
+                <a:ea typeface="+mn-ea"/>
+                <a:cs typeface="+mn-cs"/>
+              </a:rPr>
+              <a:t> Score: 0.8693262411347518 is the measure of the accuracy of the model in predicting that a customer will cancel the booking.</a:t>
+            </a:r>
+          </a:p>
+          <a:p>
+            <a:pPr marL="171450" indent="-171450">
+              <a:buFont typeface="Arial" panose="020B0604020202020204" pitchFamily="34" charset="0"/>
+              <a:buChar char="•"/>
+            </a:pPr>
+            <a:r>
+              <a:rPr lang="en-US" sz="1200" b="1" i="0" kern="1200" dirty="0">
+                <a:solidFill>
+                  <a:schemeClr val="tx1"/>
+                </a:solidFill>
+                <a:effectLst/>
+                <a:latin typeface="Arial" charset="0"/>
+                <a:ea typeface="+mn-ea"/>
+                <a:cs typeface="+mn-cs"/>
+              </a:rPr>
+              <a:t>Sensitivity /</a:t>
+            </a:r>
+            <a:r>
+              <a:rPr lang="en-US" sz="1200" b="0" i="0" kern="1200" dirty="0">
+                <a:solidFill>
+                  <a:schemeClr val="tx1"/>
+                </a:solidFill>
+                <a:effectLst/>
+                <a:latin typeface="Arial" charset="0"/>
+                <a:ea typeface="+mn-ea"/>
+                <a:cs typeface="+mn-cs"/>
+              </a:rPr>
+              <a:t> (</a:t>
+            </a:r>
+            <a:r>
+              <a:rPr lang="en-US" sz="1200" b="1" i="0" kern="1200" dirty="0">
+                <a:solidFill>
+                  <a:schemeClr val="tx1"/>
+                </a:solidFill>
+                <a:effectLst/>
+                <a:latin typeface="Arial" charset="0"/>
+                <a:ea typeface="+mn-ea"/>
+                <a:cs typeface="+mn-cs"/>
+              </a:rPr>
+              <a:t>Recall</a:t>
+            </a:r>
+            <a:r>
+              <a:rPr lang="en-US" sz="1200" b="0" i="0" kern="1200" dirty="0">
+                <a:solidFill>
+                  <a:schemeClr val="tx1"/>
+                </a:solidFill>
+                <a:effectLst/>
+                <a:latin typeface="Arial" charset="0"/>
+                <a:ea typeface="+mn-ea"/>
+                <a:cs typeface="+mn-cs"/>
+              </a:rPr>
+              <a:t>) Score: 0.8098777667657747 of the cancellations are correctly identified as been canceled. </a:t>
+            </a:r>
+          </a:p>
+          <a:p>
+            <a:pPr marL="0" indent="0">
+              <a:buFont typeface="Arial" panose="020B0604020202020204" pitchFamily="34" charset="0"/>
+              <a:buNone/>
+            </a:pPr>
+            <a:r>
+              <a:rPr lang="en-US" sz="1200" b="0" i="0" kern="1200" dirty="0">
+                <a:solidFill>
+                  <a:schemeClr val="tx1"/>
+                </a:solidFill>
+                <a:effectLst/>
+                <a:latin typeface="Arial" charset="0"/>
+                <a:ea typeface="+mn-ea"/>
+                <a:cs typeface="+mn-cs"/>
+              </a:rPr>
+              <a:t>  (True Positive Rate) – Improving hotel’s managements' ability to predict with </a:t>
+            </a:r>
+            <a:r>
+              <a:rPr lang="en-US" sz="1200" b="1" i="0" kern="1200" dirty="0">
+                <a:solidFill>
+                  <a:schemeClr val="tx1"/>
+                </a:solidFill>
+                <a:effectLst/>
+                <a:latin typeface="Arial" charset="0"/>
+                <a:ea typeface="+mn-ea"/>
+                <a:cs typeface="+mn-cs"/>
+              </a:rPr>
+              <a:t>81%</a:t>
+            </a:r>
+            <a:r>
+              <a:rPr lang="en-US" sz="1200" b="0" i="0" kern="1200" dirty="0">
+                <a:solidFill>
+                  <a:schemeClr val="tx1"/>
+                </a:solidFill>
+                <a:effectLst/>
+                <a:latin typeface="Arial" charset="0"/>
+                <a:ea typeface="+mn-ea"/>
+                <a:cs typeface="+mn-cs"/>
+              </a:rPr>
+              <a:t> accuracy - overbooking situations and potential for negative feedback on social channels impacting the hotel’s reputation.</a:t>
+            </a:r>
+          </a:p>
+          <a:p>
+            <a:pPr marL="171450" indent="-171450">
+              <a:buFont typeface="Arial" panose="020B0604020202020204" pitchFamily="34" charset="0"/>
+              <a:buChar char="•"/>
+            </a:pPr>
+            <a:r>
+              <a:rPr lang="en-US" sz="1200" b="1" i="0" kern="1200" dirty="0">
+                <a:solidFill>
+                  <a:schemeClr val="tx1"/>
+                </a:solidFill>
+                <a:effectLst/>
+                <a:latin typeface="Arial" charset="0"/>
+                <a:ea typeface="+mn-ea"/>
+                <a:cs typeface="+mn-cs"/>
+              </a:rPr>
+              <a:t>Specificity</a:t>
+            </a:r>
+            <a:r>
+              <a:rPr lang="en-US" sz="1200" b="0" i="0" kern="1200" dirty="0">
+                <a:solidFill>
+                  <a:schemeClr val="tx1"/>
+                </a:solidFill>
+                <a:effectLst/>
+                <a:latin typeface="Arial" charset="0"/>
+                <a:ea typeface="+mn-ea"/>
+                <a:cs typeface="+mn-cs"/>
+              </a:rPr>
+              <a:t> Score: 0.9214327594477907 of the successful bookings are correctly identified as not been canceled.</a:t>
+            </a:r>
+          </a:p>
+          <a:p>
+            <a:pPr marL="0" indent="0">
+              <a:buFont typeface="Arial" panose="020B0604020202020204" pitchFamily="34" charset="0"/>
+              <a:buNone/>
+            </a:pPr>
+            <a:r>
+              <a:rPr lang="en-US" sz="1200" b="0" i="0" kern="1200" dirty="0">
+                <a:solidFill>
+                  <a:schemeClr val="tx1"/>
+                </a:solidFill>
+                <a:effectLst/>
+                <a:latin typeface="Arial" charset="0"/>
+                <a:ea typeface="+mn-ea"/>
+                <a:cs typeface="+mn-cs"/>
+              </a:rPr>
+              <a:t>  (True Negative Rate) – Improving hotel’s managements' ability to predict with </a:t>
+            </a:r>
+            <a:r>
+              <a:rPr lang="en-US" sz="1200" b="1" i="0" kern="1200" dirty="0">
+                <a:solidFill>
+                  <a:schemeClr val="tx1"/>
+                </a:solidFill>
+                <a:effectLst/>
+                <a:latin typeface="Arial" charset="0"/>
+                <a:ea typeface="+mn-ea"/>
+                <a:cs typeface="+mn-cs"/>
+              </a:rPr>
+              <a:t>92%</a:t>
+            </a:r>
+            <a:r>
+              <a:rPr lang="en-US" sz="1200" b="0" i="0" kern="1200" dirty="0">
+                <a:solidFill>
+                  <a:schemeClr val="tx1"/>
+                </a:solidFill>
+                <a:effectLst/>
+                <a:latin typeface="Arial" charset="0"/>
+                <a:ea typeface="+mn-ea"/>
+                <a:cs typeface="+mn-cs"/>
+              </a:rPr>
+              <a:t> accuracy - hotel revenue loss and staffing requirements/allocation.</a:t>
+            </a:r>
+          </a:p>
+          <a:p>
             <a:pPr eaLnBrk="1" hangingPunct="1">
               <a:lnSpc>
                 <a:spcPct val="95000"/>
@@ -1962,8 +2605,119 @@
                 <a:ea typeface="+mn-ea"/>
                 <a:cs typeface="+mn-cs"/>
               </a:rPr>
-              <a:t>Hotels should analyze the growth rate of their respective channels and look at which one(s) are generating incremental revenue. Make sure those are optimized with high quality and up-to-date visuals, room inventory availability and rates. Ensure that B2C prices are not being undercut by OTAs, wholesalers, resellers and bed banks, as this disparity will likely hurt overall growth.</a:t>
-            </a:r>
+              <a:t>1- Hotels should analyze the growth rate of their respective channels and look at which one(s) are generating incremental revenue. Make sure those are optimized with high quality and up-to-date visuals, room inventory availability and rates. Ensure that B2C prices are not being undercut by OTAs, wholesalers, resellers and bed banks, as this disparity will likely hurt overall growth.</a:t>
+            </a:r>
+          </a:p>
+          <a:p>
+            <a:pPr marL="0" indent="0" algn="l" eaLnBrk="0" hangingPunct="0">
+              <a:spcBef>
+                <a:spcPct val="20000"/>
+              </a:spcBef>
+              <a:buNone/>
+            </a:pPr>
+            <a:endParaRPr lang="en-US" sz="1200" b="0" kern="0" dirty="0">
+              <a:solidFill>
+                <a:schemeClr val="tx1"/>
+              </a:solidFill>
+              <a:latin typeface="Arial" charset="0"/>
+              <a:ea typeface="+mn-ea"/>
+              <a:cs typeface="+mn-cs"/>
+            </a:endParaRPr>
+          </a:p>
+          <a:p>
+            <a:pPr marL="0" indent="0" algn="l" eaLnBrk="0" hangingPunct="0">
+              <a:spcBef>
+                <a:spcPct val="20000"/>
+              </a:spcBef>
+              <a:buNone/>
+            </a:pPr>
+            <a:r>
+              <a:rPr lang="en-US" sz="1200" b="0" u="sng" kern="0" dirty="0">
+                <a:solidFill>
+                  <a:schemeClr val="tx1"/>
+                </a:solidFill>
+                <a:latin typeface="Arial" charset="0"/>
+                <a:ea typeface="+mn-ea"/>
+                <a:cs typeface="+mn-cs"/>
+              </a:rPr>
+              <a:t>Note</a:t>
+            </a:r>
+            <a:r>
+              <a:rPr lang="en-US" sz="1200" b="0" kern="0" dirty="0">
+                <a:solidFill>
+                  <a:schemeClr val="tx1"/>
+                </a:solidFill>
+                <a:latin typeface="Arial" charset="0"/>
+                <a:ea typeface="+mn-ea"/>
+                <a:cs typeface="+mn-cs"/>
+              </a:rPr>
+              <a:t>: </a:t>
+            </a:r>
+          </a:p>
+          <a:p>
+            <a:pPr marL="171450" indent="-171450" algn="l" eaLnBrk="0" hangingPunct="0">
+              <a:spcBef>
+                <a:spcPct val="20000"/>
+              </a:spcBef>
+              <a:buFont typeface="Arial" panose="020B0604020202020204" pitchFamily="34" charset="0"/>
+              <a:buChar char="•"/>
+            </a:pPr>
+            <a:r>
+              <a:rPr lang="en-US" sz="1200" b="0" kern="0" dirty="0">
+                <a:solidFill>
+                  <a:schemeClr val="tx1"/>
+                </a:solidFill>
+                <a:latin typeface="Arial" charset="0"/>
+                <a:ea typeface="+mn-ea"/>
+                <a:cs typeface="+mn-cs"/>
+              </a:rPr>
+              <a:t>“</a:t>
+            </a:r>
+            <a:r>
+              <a:rPr lang="en-US" sz="1200" b="0" u="sng" kern="0" dirty="0">
+                <a:solidFill>
+                  <a:schemeClr val="tx1"/>
+                </a:solidFill>
+                <a:latin typeface="Arial" charset="0"/>
+                <a:ea typeface="+mn-ea"/>
+                <a:cs typeface="+mn-cs"/>
+              </a:rPr>
+              <a:t>Direct</a:t>
+            </a:r>
+            <a:r>
+              <a:rPr lang="en-US" sz="1200" b="0" kern="0" dirty="0">
+                <a:solidFill>
+                  <a:schemeClr val="tx1"/>
+                </a:solidFill>
+                <a:latin typeface="Arial" charset="0"/>
+                <a:ea typeface="+mn-ea"/>
+                <a:cs typeface="+mn-cs"/>
+              </a:rPr>
+              <a:t>” and “Corporate” has the least cancellations with </a:t>
+            </a:r>
+            <a:r>
+              <a:rPr lang="en-US" sz="1200" b="1" kern="0" dirty="0">
+                <a:solidFill>
+                  <a:schemeClr val="tx1"/>
+                </a:solidFill>
+                <a:latin typeface="Arial" charset="0"/>
+                <a:ea typeface="+mn-ea"/>
+                <a:cs typeface="+mn-cs"/>
+              </a:rPr>
+              <a:t>4%</a:t>
+            </a:r>
+            <a:r>
+              <a:rPr lang="en-US" sz="1200" b="0" kern="0" dirty="0">
+                <a:solidFill>
+                  <a:schemeClr val="tx1"/>
+                </a:solidFill>
+                <a:latin typeface="Arial" charset="0"/>
+                <a:ea typeface="+mn-ea"/>
+                <a:cs typeface="+mn-cs"/>
+              </a:rPr>
+              <a:t> and 2%, respectively.</a:t>
+            </a:r>
+            <a:endParaRPr lang="en-US" b="0" dirty="0"/>
           </a:p>
           <a:p>
             <a:pPr marL="0" marR="0" lvl="0" indent="0" algn="l" defTabSz="914400" rtl="0" eaLnBrk="1" fontAlgn="base" latinLnBrk="0" hangingPunct="1">
@@ -2021,7 +2775,7 @@
                 <a:ea typeface="+mn-ea"/>
                 <a:cs typeface="+mn-cs"/>
               </a:rPr>
-              <a:t>We advise hotels to ensure they use channel management tools with a robust two-way connection, so that canceled inventory can be fed back and re-distributed across all channels in real-time. Favoring not-refundable rates over flexible ones or implementing more rigid cancellation policies can also help to limit the issue.</a:t>
+              <a:t>2- We advise hotels to ensure they use channel management tools with a robust two-way connection, so that canceled inventory can be fed back and re-distributed across all channels in real-time. Favoring not-refundable rates over flexible ones or implementing more rigid cancellation policies can also help to limit the issue.</a:t>
             </a:r>
             <a:endParaRPr lang="en-US" sz="1200" b="1" kern="1200" dirty="0">
               <a:solidFill>
@@ -2086,27 +2840,12 @@
                 <a:ea typeface="+mn-ea"/>
                 <a:cs typeface="+mn-cs"/>
               </a:rPr>
-              <a:t>Allow hotel managers to act on bookings with high cancellation probability and contain the associated revenue losses, produce better net demand forecasts, improve overbooking/cancellation policies, and have more assertive pricing and inventory allocation strategies.</a:t>
-            </a:r>
-          </a:p>
-          <a:p>
-            <a:pPr marL="0" marR="0" lvl="0" indent="0" algn="l" defTabSz="914400" rtl="0" eaLnBrk="1" fontAlgn="base" latinLnBrk="0" hangingPunct="1">
-              <a:lnSpc>
-                <a:spcPct val="95000"/>
-              </a:lnSpc>
-              <a:spcBef>
-                <a:spcPct val="25000"/>
-              </a:spcBef>
-              <a:spcAft>
-                <a:spcPct val="0"/>
-              </a:spcAft>
-              <a:buClrTx/>
-              <a:buSzTx/>
-              <a:buFontTx/>
-              <a:buNone/>
-              <a:tabLst/>
-              <a:defRPr/>
-            </a:pPr>
+              <a:t>3- Allow hotel managers to act on bookings with high cancellation probability and contain the associated revenue losses, produce better net demand forecasts, improve overbooking/cancellation policies (</a:t>
+            </a:r>
+            <a:r>
+              <a:rPr lang="en-US" sz="1200" b="0" dirty="0"/>
+              <a:t>Implement more rigid cancellation policies </a:t>
+            </a:r>
             <a:r>
               <a:rPr lang="en-US" sz="1200" b="0" kern="1200" dirty="0">
                 <a:solidFill>
@@ -2116,74 +2855,8 @@
                 <a:ea typeface="+mn-ea"/>
                 <a:cs typeface="+mn-cs"/>
               </a:rPr>
-              <a:t>---</a:t>
-            </a:r>
-          </a:p>
-          <a:p>
-            <a:pPr marL="0" marR="0" lvl="0" indent="0" algn="l" defTabSz="914400" rtl="0" eaLnBrk="1" fontAlgn="base" latinLnBrk="0" hangingPunct="1">
-              <a:lnSpc>
-                <a:spcPct val="95000"/>
-              </a:lnSpc>
-              <a:spcBef>
-                <a:spcPct val="25000"/>
-              </a:spcBef>
-              <a:spcAft>
-                <a:spcPct val="0"/>
-              </a:spcAft>
-              <a:buClrTx/>
-              <a:buSzTx/>
-              <a:buFontTx/>
-              <a:buNone/>
-              <a:tabLst/>
-              <a:defRPr/>
-            </a:pPr>
-            <a:r>
-              <a:rPr lang="en-US" sz="1200" b="0" kern="1200" dirty="0">
-                <a:solidFill>
-                  <a:schemeClr val="tx1"/>
-                </a:solidFill>
-                <a:effectLst/>
-                <a:latin typeface="Arial" charset="0"/>
-                <a:ea typeface="+mn-ea"/>
-                <a:cs typeface="+mn-cs"/>
-              </a:rPr>
-              <a:t>To tackle the uncertainty arising from booking cancellations, we combined the data from eight hotels’ property management systems with data from several sources (weather, holidays, events, social reputation, and online prices/inventory) and machine learning interpretable algorithms to develop booking cancellation prediction models for the hotels. In a real production environment, improvement of the forecast accuracy due to the use of these models could enable hoteliers to decrease the number of cancellations, thus, increasing confidence in demand-management decisions.</a:t>
-            </a:r>
-            <a:endParaRPr lang="en-US" sz="1200" b="0" kern="1200" dirty="0">
-              <a:solidFill>
-                <a:schemeClr val="tx1"/>
-              </a:solidFill>
-              <a:latin typeface="Arial" charset="0"/>
-              <a:ea typeface="+mn-ea"/>
-              <a:cs typeface="+mn-cs"/>
-            </a:endParaRPr>
-          </a:p>
-          <a:p>
-            <a:pPr marL="0" marR="0" lvl="0" indent="0" algn="l" defTabSz="914400" rtl="0" eaLnBrk="1" fontAlgn="base" latinLnBrk="0" hangingPunct="1">
-              <a:lnSpc>
-                <a:spcPct val="95000"/>
-              </a:lnSpc>
-              <a:spcBef>
-                <a:spcPct val="25000"/>
-              </a:spcBef>
-              <a:spcAft>
-                <a:spcPct val="0"/>
-              </a:spcAft>
-              <a:buClrTx/>
-              <a:buSzTx/>
-              <a:buFontTx/>
-              <a:buNone/>
-              <a:tabLst/>
-              <a:defRPr/>
-            </a:pPr>
-            <a:endParaRPr lang="en-US" sz="1200" b="1" kern="1200" dirty="0">
-              <a:solidFill>
-                <a:schemeClr val="tx1"/>
-              </a:solidFill>
-              <a:latin typeface="Arial" charset="0"/>
-              <a:ea typeface="+mn-ea"/>
-              <a:cs typeface="+mn-cs"/>
-            </a:endParaRPr>
+              <a:t>), and have more assertive pricing and inventory allocation strategies.</a:t>
+            </a:r>
           </a:p>
           <a:p>
             <a:pPr eaLnBrk="1" hangingPunct="1">
@@ -2255,7 +2928,18 @@
           <a:bodyPr/>
           <a:lstStyle/>
           <a:p>
-            <a:endParaRPr lang="en-US" dirty="0"/>
+            <a:r>
+              <a:rPr lang="en-US" dirty="0"/>
+              <a:t>Demonstration | Single Out-of-Sample prediction using the machine learning model built using </a:t>
+            </a:r>
+            <a:r>
+              <a:rPr lang="en-US" dirty="0" err="1"/>
+              <a:t>RandomForest</a:t>
+            </a:r>
+            <a:r>
+              <a:rPr lang="en-US" dirty="0"/>
+              <a:t> Classifier.</a:t>
+            </a:r>
           </a:p>
         </p:txBody>
       </p:sp>
@@ -2388,18 +3072,97 @@
           <a:bodyPr/>
           <a:lstStyle/>
           <a:p>
-            <a:pPr eaLnBrk="1" hangingPunct="1">
+            <a:pPr marL="171450" indent="-171450" algn="l">
+              <a:lnSpc>
+                <a:spcPct val="100000"/>
+              </a:lnSpc>
+              <a:spcBef>
+                <a:spcPct val="20000"/>
+              </a:spcBef>
+              <a:buFont typeface="Arial" panose="020B0604020202020204" pitchFamily="34" charset="0"/>
+              <a:buChar char="•"/>
+            </a:pPr>
+            <a:r>
+              <a:rPr lang="en-US" sz="1200" b="0" dirty="0"/>
+              <a:t>Perform analysis between the city hotel and resort to gain insights into cancellation behaviors.</a:t>
+            </a:r>
+          </a:p>
+          <a:p>
+            <a:pPr marL="171450" indent="-171450" algn="l">
+              <a:lnSpc>
+                <a:spcPct val="100000"/>
+              </a:lnSpc>
+              <a:spcBef>
+                <a:spcPct val="20000"/>
+              </a:spcBef>
+              <a:buFont typeface="Arial" panose="020B0604020202020204" pitchFamily="34" charset="0"/>
+              <a:buChar char="•"/>
+            </a:pPr>
+            <a:r>
+              <a:rPr lang="en-US" sz="1200" b="0" dirty="0"/>
+              <a:t>Build a neural network to determine if an increase in accuracy can be achieved from 88% to 90%.</a:t>
+            </a:r>
+          </a:p>
+          <a:p>
+            <a:pPr marL="171450" indent="-171450" eaLnBrk="1" hangingPunct="1">
               <a:lnSpc>
                 <a:spcPct val="95000"/>
               </a:lnSpc>
               <a:spcBef>
                 <a:spcPct val="25000"/>
               </a:spcBef>
+              <a:buFont typeface="Arial" panose="020B0604020202020204" pitchFamily="34" charset="0"/>
+              <a:buChar char="•"/>
             </a:pPr>
             <a:r>
               <a:rPr lang="en-US" b="0" dirty="0"/>
-              <a:t>- Create a GUI to help hotel convert low cancellation probabilities into revenue, by offering suggestions for amenities, price discounts, etc.</a:t>
-            </a:r>
+              <a:t>Create a GUI to help hotel convert low cancellation probabilities into revenue, by offering suggestions for amenities, price discounts, etc.</a:t>
+            </a:r>
+          </a:p>
+          <a:p>
+            <a:pPr marL="171450" indent="-171450" algn="l">
+              <a:lnSpc>
+                <a:spcPct val="100000"/>
+              </a:lnSpc>
+              <a:spcBef>
+                <a:spcPct val="20000"/>
+              </a:spcBef>
+              <a:buFont typeface="Arial" panose="020B0604020202020204" pitchFamily="34" charset="0"/>
+              <a:buChar char="•"/>
+            </a:pPr>
+            <a:r>
+              <a:rPr lang="en-US" sz="1200" b="0" dirty="0"/>
+              <a:t>Perform analysis to determine which OTA will serve the hotel business better.</a:t>
+            </a:r>
+          </a:p>
+          <a:p>
+            <a:pPr marL="171450" indent="-171450" algn="l">
+              <a:lnSpc>
+                <a:spcPct val="100000"/>
+              </a:lnSpc>
+              <a:spcBef>
+                <a:spcPct val="20000"/>
+              </a:spcBef>
+              <a:buFont typeface="Arial" panose="020B0604020202020204" pitchFamily="34" charset="0"/>
+              <a:buChar char="•"/>
+            </a:pPr>
+            <a:r>
+              <a:rPr lang="en-US" sz="1200" b="0" dirty="0"/>
+              <a:t>Analyze data from weather, holidays, events, social reputation, and online prices/inventory.</a:t>
+            </a:r>
+          </a:p>
+          <a:p>
+            <a:pPr marL="0" indent="0" eaLnBrk="1" hangingPunct="1">
+              <a:lnSpc>
+                <a:spcPct val="95000"/>
+              </a:lnSpc>
+              <a:spcBef>
+                <a:spcPct val="25000"/>
+              </a:spcBef>
+              <a:buFont typeface="Arial" panose="020B0604020202020204" pitchFamily="34" charset="0"/>
+              <a:buNone/>
+            </a:pPr>
+            <a:endParaRPr lang="en-US" b="0" dirty="0"/>
           </a:p>
         </p:txBody>
       </p:sp>
@@ -2459,6 +3222,152 @@
         <p:txBody>
           <a:bodyPr/>
           <a:lstStyle/>
+          <a:p>
+            <a:r>
+              <a:rPr lang="en-US" dirty="0"/>
+              <a:t>Thank you!</a:t>
+            </a:r>
+          </a:p>
+          <a:p>
+            <a:r>
+              <a:rPr lang="en-US" dirty="0"/>
+              <a:t>__</a:t>
+            </a:r>
+          </a:p>
+          <a:p>
+            <a:pPr marL="0" marR="0" lvl="0" indent="0" algn="l" defTabSz="914400" rtl="0" eaLnBrk="0" fontAlgn="base" latinLnBrk="0" hangingPunct="0">
+              <a:lnSpc>
+                <a:spcPct val="100000"/>
+              </a:lnSpc>
+              <a:spcBef>
+                <a:spcPct val="30000"/>
+              </a:spcBef>
+              <a:spcAft>
+                <a:spcPct val="0"/>
+              </a:spcAft>
+              <a:buClrTx/>
+              <a:buSzTx/>
+              <a:buFontTx/>
+              <a:buNone/>
+              <a:tabLst/>
+              <a:defRPr/>
+            </a:pPr>
+            <a:r>
+              <a:rPr lang="en-US" sz="1200" b="1" kern="1200" dirty="0">
+                <a:solidFill>
+                  <a:schemeClr val="bg1"/>
+                </a:solidFill>
+                <a:latin typeface="Arial" charset="0"/>
+                <a:ea typeface="+mn-ea"/>
+                <a:cs typeface="+mn-cs"/>
+              </a:rPr>
+              <a:t>LinkedIn: </a:t>
+            </a:r>
+            <a:r>
+              <a:rPr lang="en-US" sz="1200" dirty="0">
+                <a:solidFill>
+                  <a:schemeClr val="bg1"/>
+                </a:solidFill>
+                <a:hlinkClick r:id="rId3">
+                  <a:extLst>
+                    <a:ext uri="{A12FA001-AC4F-418D-AE19-62706E023703}">
+                      <ahyp:hlinkClr xmlns:ahyp="http://schemas.microsoft.com/office/drawing/2018/hyperlinkcolor" val="tx"/>
+                    </a:ext>
+                  </a:extLst>
+                </a:hlinkClick>
+              </a:rPr>
+              <a:t>https://www.linkedin.com/in/sharonda-pettiett-8975693b/</a:t>
+            </a:r>
+            <a:endParaRPr lang="en-US" sz="1200" dirty="0">
+              <a:solidFill>
+                <a:schemeClr val="bg1"/>
+              </a:solidFill>
+            </a:endParaRPr>
+          </a:p>
+          <a:p>
+            <a:pPr marL="0" marR="0" lvl="0" indent="0" algn="l" defTabSz="914400" rtl="0" eaLnBrk="0" fontAlgn="base" latinLnBrk="0" hangingPunct="0">
+              <a:lnSpc>
+                <a:spcPct val="100000"/>
+              </a:lnSpc>
+              <a:spcBef>
+                <a:spcPct val="30000"/>
+              </a:spcBef>
+              <a:spcAft>
+                <a:spcPct val="0"/>
+              </a:spcAft>
+              <a:buClrTx/>
+              <a:buSzTx/>
+              <a:buFontTx/>
+              <a:buNone/>
+              <a:tabLst/>
+              <a:defRPr/>
+            </a:pPr>
+            <a:r>
+              <a:rPr lang="en-US" sz="1200" b="1" kern="1200" dirty="0" err="1">
+                <a:solidFill>
+                  <a:schemeClr val="bg1"/>
+                </a:solidFill>
+                <a:latin typeface="Arial" charset="0"/>
+                <a:ea typeface="+mn-ea"/>
+                <a:cs typeface="+mn-cs"/>
+              </a:rPr>
+              <a:t>Github</a:t>
+            </a:r>
+            <a:r>
+              <a:rPr lang="en-US" sz="1200" b="1" kern="1200" dirty="0">
+                <a:solidFill>
+                  <a:schemeClr val="bg1"/>
+                </a:solidFill>
+                <a:latin typeface="Arial" charset="0"/>
+                <a:ea typeface="+mn-ea"/>
+                <a:cs typeface="+mn-cs"/>
+              </a:rPr>
+              <a:t>: </a:t>
+            </a:r>
+            <a:r>
+              <a:rPr lang="en-US" sz="1200" dirty="0">
+                <a:solidFill>
+                  <a:schemeClr val="bg1"/>
+                </a:solidFill>
+              </a:rPr>
+              <a:t>TBD</a:t>
+            </a:r>
+            <a:endParaRPr lang="en-US" sz="1200" b="1" kern="1200" dirty="0">
+              <a:solidFill>
+                <a:schemeClr val="bg1"/>
+              </a:solidFill>
+              <a:latin typeface="Arial" charset="0"/>
+              <a:ea typeface="+mn-ea"/>
+              <a:cs typeface="+mn-cs"/>
+            </a:endParaRPr>
+          </a:p>
+          <a:p>
+            <a:pPr marL="0" marR="0" lvl="0" indent="0" algn="l" defTabSz="914400" rtl="0" eaLnBrk="0" fontAlgn="base" latinLnBrk="0" hangingPunct="0">
+              <a:lnSpc>
+                <a:spcPct val="100000"/>
+              </a:lnSpc>
+              <a:spcBef>
+                <a:spcPct val="30000"/>
+              </a:spcBef>
+              <a:spcAft>
+                <a:spcPct val="0"/>
+              </a:spcAft>
+              <a:buClrTx/>
+              <a:buSzTx/>
+              <a:buFontTx/>
+              <a:buNone/>
+              <a:tabLst/>
+              <a:defRPr/>
+            </a:pPr>
+            <a:endParaRPr lang="en-US" sz="1200" b="1" kern="1200" dirty="0">
+              <a:solidFill>
+                <a:schemeClr val="bg1"/>
+              </a:solidFill>
+              <a:latin typeface="Arial" charset="0"/>
+              <a:ea typeface="+mn-ea"/>
+              <a:cs typeface="+mn-cs"/>
+            </a:endParaRPr>
+          </a:p>
           <a:p>
             <a:endParaRPr lang="en-US" dirty="0"/>
           </a:p>
@@ -2621,6 +3530,80 @@
           <a:bodyPr/>
           <a:lstStyle/>
           <a:p>
+            <a:r>
+              <a:rPr lang="en-US" b="0" dirty="0"/>
+              <a:t>As a person who loves to travel it is very ‘annoying’ when you arrive at the hotel and find out that your reservation has been “CANCELLED”!</a:t>
+            </a:r>
+          </a:p>
+          <a:p>
+            <a:r>
+              <a:rPr lang="en-US" b="0" dirty="0"/>
+              <a:t>Well, this is an issue that resorts and hotels in Lisbon, Portugal are experiencing at a cancellation rate of 37%.</a:t>
+            </a:r>
+          </a:p>
+          <a:p>
+            <a:r>
+              <a:rPr lang="en-US" b="0" dirty="0"/>
+              <a:t>Booking cancellations in the hospitality industry can result in:</a:t>
+            </a:r>
+          </a:p>
+          <a:p>
+            <a:r>
+              <a:rPr lang="en-US" b="0" dirty="0"/>
+              <a:t>(Customer Impact)</a:t>
+            </a:r>
+          </a:p>
+          <a:p>
+            <a:pPr marL="285750" lvl="1" indent="-171450">
+              <a:buFont typeface="Arial" panose="020B0604020202020204" pitchFamily="34" charset="0"/>
+              <a:buChar char="•"/>
+            </a:pPr>
+            <a:r>
+              <a:rPr lang="en-US" dirty="0"/>
+              <a:t>Overbooking situations</a:t>
+            </a:r>
+          </a:p>
+          <a:p>
+            <a:pPr marL="285750" lvl="1" indent="-171450">
+              <a:buFont typeface="Arial" panose="020B0604020202020204" pitchFamily="34" charset="0"/>
+              <a:buChar char="•"/>
+            </a:pPr>
+            <a:r>
+              <a:rPr lang="en-US" dirty="0"/>
+              <a:t>Hotel’s online social reputation</a:t>
+            </a:r>
+          </a:p>
+          <a:p>
+            <a:pPr marL="0" lvl="0" indent="0">
+              <a:buFont typeface="Arial" panose="020B0604020202020204" pitchFamily="34" charset="0"/>
+              <a:buNone/>
+            </a:pPr>
+            <a:r>
+              <a:rPr lang="en-US" b="0" dirty="0"/>
+              <a:t>(Hotel Impact)</a:t>
+            </a:r>
+          </a:p>
+          <a:p>
+            <a:pPr marL="285750" lvl="1" indent="-171450">
+              <a:buFont typeface="Arial" panose="020B0604020202020204" pitchFamily="34" charset="0"/>
+              <a:buChar char="•"/>
+            </a:pPr>
+            <a:r>
+              <a:rPr lang="en-US" dirty="0"/>
+              <a:t>Revenue loss </a:t>
+            </a:r>
+          </a:p>
+          <a:p>
+            <a:pPr marL="285750" lvl="1" indent="-171450">
+              <a:buFont typeface="Arial" panose="020B0604020202020204" pitchFamily="34" charset="0"/>
+              <a:buChar char="•"/>
+            </a:pPr>
+            <a:r>
+              <a:rPr lang="en-US" dirty="0"/>
+              <a:t>Pricing, inventory and labor allocation decisions</a:t>
+            </a:r>
+          </a:p>
+          <a:p>
             <a:endParaRPr lang="en-US" b="0" dirty="0"/>
           </a:p>
         </p:txBody>
@@ -2780,8 +3763,40 @@
                 <a:ea typeface="+mn-ea"/>
                 <a:cs typeface="+mn-cs"/>
               </a:rPr>
-              <a:t>By employing data sets from four resort hotels and addressing this issue as a classification problem in the scope of data science, the authors demonstrate that it is possible to build models for predicting booking cancellations with accuracy results in excess of 90%. This research also demonstrates that despite what was alleged by Morales and Wang (2010), it is possible to predict with high accuracy whether a booking will be canceled. Results allow hotel managers to act on bookings with high cancellation probability and contain the associated revenue losses, produce better net demand forecasts, improve overbooking/cancellation policies, and have more assertive pricing and inventory allocation strategies.</a:t>
-            </a:r>
+              <a:t>Our business value … is to tackle the uncertainty </a:t>
+            </a:r>
+            <a:r>
+              <a:rPr lang="en-US" sz="1200" b="0" u="sng" kern="1200" dirty="0">
+                <a:solidFill>
+                  <a:schemeClr val="tx1"/>
+                </a:solidFill>
+                <a:effectLst/>
+                <a:latin typeface="Arial" charset="0"/>
+                <a:ea typeface="+mn-ea"/>
+                <a:cs typeface="+mn-cs"/>
+              </a:rPr>
+              <a:t>arising</a:t>
+            </a:r>
+            <a:r>
+              <a:rPr lang="en-US" sz="1200" b="0" kern="1200" dirty="0">
+                <a:solidFill>
+                  <a:schemeClr val="tx1"/>
+                </a:solidFill>
+                <a:effectLst/>
+                <a:latin typeface="Arial" charset="0"/>
+                <a:ea typeface="+mn-ea"/>
+                <a:cs typeface="+mn-cs"/>
+              </a:rPr>
+              <a:t> from booking cancellations, we combined the data from city and resort hotel properties and by using machine learning algorithms to develop booking cancellation prediction models for the hotels. In a real production environment, improvement of the forecast accuracy due to the use of these models could enable hoteliers to decrease the number of cancellations, thus, increasing confidence in demand-management decisions.</a:t>
+            </a:r>
+            <a:endParaRPr lang="en-US" sz="1200" b="0" kern="1200" dirty="0">
+              <a:solidFill>
+                <a:schemeClr val="tx1"/>
+              </a:solidFill>
+              <a:latin typeface="Arial" charset="0"/>
+              <a:ea typeface="+mn-ea"/>
+              <a:cs typeface="+mn-cs"/>
+            </a:endParaRPr>
           </a:p>
           <a:p>
             <a:pPr marL="0" marR="0" lvl="0" indent="0" algn="l" defTabSz="914400" rtl="0" eaLnBrk="0" fontAlgn="base" latinLnBrk="0" hangingPunct="0">
@@ -2801,18 +3816,15 @@
               <a:tabLst/>
               <a:defRPr/>
             </a:pPr>
-            <a:r>
-              <a:rPr lang="en-US" sz="1200" b="0" kern="1200" dirty="0">
-                <a:solidFill>
-                  <a:schemeClr val="tx1"/>
-                </a:solidFill>
-                <a:effectLst/>
-                <a:latin typeface="Arial" charset="0"/>
-                <a:ea typeface="+mn-ea"/>
-                <a:cs typeface="+mn-cs"/>
-              </a:rPr>
-              <a:t>---</a:t>
-            </a:r>
+            <a:endParaRPr lang="en-US" sz="1200" b="0" kern="1200" dirty="0">
+              <a:solidFill>
+                <a:schemeClr val="tx1"/>
+              </a:solidFill>
+              <a:effectLst/>
+              <a:latin typeface="Arial" charset="0"/>
+              <a:ea typeface="+mn-ea"/>
+              <a:cs typeface="+mn-cs"/>
+            </a:endParaRPr>
           </a:p>
           <a:p>
             <a:pPr marL="0" marR="0" lvl="0" indent="0" algn="l" defTabSz="914400" rtl="0" eaLnBrk="0" fontAlgn="base" latinLnBrk="0" hangingPunct="0">
@@ -2832,34 +3844,6 @@
               <a:tabLst/>
               <a:defRPr/>
             </a:pPr>
-            <a:endParaRPr lang="en-US" sz="1200" b="0" kern="1200" dirty="0">
-              <a:solidFill>
-                <a:schemeClr val="tx1"/>
-              </a:solidFill>
-              <a:effectLst/>
-              <a:latin typeface="Arial" charset="0"/>
-              <a:ea typeface="+mn-ea"/>
-              <a:cs typeface="+mn-cs"/>
-            </a:endParaRPr>
-          </a:p>
-          <a:p>
-            <a:pPr marL="0" marR="0" lvl="0" indent="0" algn="l" defTabSz="914400" rtl="0" eaLnBrk="1" fontAlgn="base" latinLnBrk="0" hangingPunct="1">
-              <a:lnSpc>
-                <a:spcPct val="95000"/>
-              </a:lnSpc>
-              <a:spcBef>
-                <a:spcPct val="25000"/>
-              </a:spcBef>
-              <a:spcAft>
-                <a:spcPct val="0"/>
-              </a:spcAft>
-              <a:buClrTx/>
-              <a:buSzTx/>
-              <a:buFontTx/>
-              <a:buNone/>
-              <a:tabLst/>
-              <a:defRPr/>
-            </a:pPr>
             <a:r>
               <a:rPr lang="en-US" sz="1200" b="0" kern="1200" dirty="0">
                 <a:solidFill>
@@ -2870,71 +3854,8 @@
                 <a:ea typeface="+mn-ea"/>
                 <a:cs typeface="+mn-cs"/>
               </a:rPr>
-              <a:t>To tackle the uncertainty arising from booking cancellations, we combined the data from eight hotels’ property management systems with data from several sources (weather, holidays, events, social reputation, and online prices/inventory) and machine learning interpretable algorithms to develop booking cancellation prediction models for the hotels. In a real production environment, improvement of the forecast accuracy due to the use of these models could enable hoteliers to decrease the number of cancellations, thus, increasing confidence in demand-management decisions.</a:t>
-            </a:r>
-            <a:endParaRPr lang="en-US" sz="1200" b="0" kern="1200" dirty="0">
-              <a:solidFill>
-                <a:schemeClr val="tx1"/>
-              </a:solidFill>
-              <a:latin typeface="Arial" charset="0"/>
-              <a:ea typeface="+mn-ea"/>
-              <a:cs typeface="+mn-cs"/>
-            </a:endParaRPr>
-          </a:p>
-          <a:p>
-            <a:pPr marL="0" marR="0" lvl="0" indent="0" algn="l" defTabSz="914400" rtl="0" eaLnBrk="1" fontAlgn="base" latinLnBrk="0" hangingPunct="1">
-              <a:lnSpc>
-                <a:spcPct val="95000"/>
-              </a:lnSpc>
-              <a:spcBef>
-                <a:spcPct val="25000"/>
-              </a:spcBef>
-              <a:spcAft>
-                <a:spcPct val="0"/>
-              </a:spcAft>
-              <a:buClrTx/>
-              <a:buSzTx/>
-              <a:buFontTx/>
-              <a:buNone/>
-              <a:tabLst/>
-              <a:defRPr/>
-            </a:pPr>
-            <a:endParaRPr lang="en-US" sz="1200" b="1" kern="1200" dirty="0">
-              <a:solidFill>
-                <a:schemeClr val="tx1"/>
-              </a:solidFill>
-              <a:latin typeface="Arial" charset="0"/>
-              <a:ea typeface="+mn-ea"/>
-              <a:cs typeface="+mn-cs"/>
-            </a:endParaRPr>
-          </a:p>
-          <a:p>
-            <a:pPr marL="0" marR="0" lvl="0" indent="0" algn="l" defTabSz="914400" rtl="0" eaLnBrk="0" fontAlgn="base" latinLnBrk="0" hangingPunct="0">
-              <a:lnSpc>
-                <a:spcPct val="100000"/>
-              </a:lnSpc>
-              <a:spcBef>
-                <a:spcPct val="30000"/>
-              </a:spcBef>
-              <a:spcAft>
-                <a:spcPct val="0"/>
-              </a:spcAft>
-              <a:buClrTx/>
-              <a:buSzTx/>
-              <a:buFontTx/>
-              <a:buNone/>
-              <a:tabLst/>
-              <a:defRPr/>
-            </a:pPr>
-            <a:endParaRPr lang="en-US" sz="1200" b="0" kern="1200" dirty="0">
-              <a:solidFill>
-                <a:schemeClr val="tx1"/>
-              </a:solidFill>
-              <a:effectLst/>
-              <a:latin typeface="Arial" charset="0"/>
-              <a:ea typeface="+mn-ea"/>
-              <a:cs typeface="+mn-cs"/>
-            </a:endParaRPr>
+              <a:t>This data set contains booking information for a city hotel and a resort hotel and includes information such as when the booking was made, length of stay, the number of adults, children, and/or babies, and the number of available parking spaces, among other things.</a:t>
+            </a:r>
           </a:p>
           <a:p>
             <a:pPr marL="0" marR="0" lvl="0" indent="0" algn="l" defTabSz="914400" rtl="0" eaLnBrk="0" fontAlgn="base" latinLnBrk="0" hangingPunct="0">
@@ -3108,7 +4029,63 @@
                 <a:ea typeface="+mn-ea"/>
                 <a:cs typeface="+mn-cs"/>
               </a:rPr>
-              <a:t>A Portuguese hotel chain - One is a resort hotel (H1), and the other is a city hotel (H2); both have more than 200 rooms and are classified as four star hotels. Data was available from July 2015 to August 2017. Because H2 engaged in a soft-opening process until the end of August 2015, only data from September 2015 onwards was considered for the modeling of H2.</a:t>
+              <a:t>By addressing this issue as a classification problem which is </a:t>
+            </a:r>
+            <a:r>
+              <a:rPr lang="en-US" sz="1200" b="0" dirty="0"/>
+              <a:t>based on a Kaggle kernel </a:t>
+            </a:r>
+            <a:r>
+              <a:rPr lang="en-US" sz="1200" b="0" kern="1200" dirty="0">
+                <a:solidFill>
+                  <a:schemeClr val="tx1"/>
+                </a:solidFill>
+                <a:effectLst/>
+                <a:latin typeface="Arial" charset="0"/>
+                <a:ea typeface="+mn-ea"/>
+                <a:cs typeface="+mn-cs"/>
+              </a:rPr>
+              <a:t>in the scope of data science the following concepts were used to gain more insights on the “cancellation” drivers:</a:t>
+            </a:r>
+          </a:p>
+          <a:p>
+            <a:pPr marL="457200" lvl="1" indent="-342900">
+              <a:buFont typeface="Arial" panose="020B0604020202020204" pitchFamily="34" charset="0"/>
+              <a:buChar char="•"/>
+            </a:pPr>
+            <a:r>
+              <a:rPr lang="en-US" sz="2400" dirty="0"/>
+              <a:t>Machine Learning (ML)</a:t>
+            </a:r>
+          </a:p>
+          <a:p>
+            <a:pPr marL="457200" lvl="1" indent="-342900">
+              <a:buFont typeface="Arial" panose="020B0604020202020204" pitchFamily="34" charset="0"/>
+              <a:buChar char="•"/>
+            </a:pPr>
+            <a:r>
+              <a:rPr lang="en-US" sz="2400" dirty="0"/>
+              <a:t>Hypothesis Testing</a:t>
+            </a:r>
+          </a:p>
+          <a:p>
+            <a:pPr marL="457200" lvl="1" indent="-342900">
+              <a:buFont typeface="Arial" panose="020B0604020202020204" pitchFamily="34" charset="0"/>
+              <a:buChar char="•"/>
+            </a:pPr>
+            <a:r>
+              <a:rPr lang="en-US" sz="2400" dirty="0"/>
+              <a:t>Time Series</a:t>
+            </a:r>
+          </a:p>
+          <a:p>
+            <a:pPr marL="457200" lvl="1" indent="-342900">
+              <a:buFont typeface="Arial" panose="020B0604020202020204" pitchFamily="34" charset="0"/>
+              <a:buChar char="•"/>
+            </a:pPr>
+            <a:r>
+              <a:rPr lang="en-US" sz="2400" dirty="0"/>
+              <a:t>Data Visualization</a:t>
             </a:r>
           </a:p>
           <a:p>
@@ -3167,7 +4144,7 @@
                 <a:ea typeface="+mn-ea"/>
                 <a:cs typeface="+mn-cs"/>
               </a:rPr>
-              <a:t>This data set contains booking information for a city hotel and a resort hotel and includes information such as when the booking was made, length of stay, the number of adults, children, and/or babies, and the number of available parking spaces, among other things.</a:t>
+              <a:t>A Portuguese hotel chain - One is a resort hotel (H1), and the other is a city hotel (H2); both have more than 200 rooms and are classified as four star hotels. Data was available from July 2015 to August 2017. Because H2 engaged in a soft-opening process until the end of August 2015, only data from September 2015 onwards was considered for the modeling of H2.</a:t>
             </a:r>
           </a:p>
           <a:p>
@@ -3390,47 +4367,6 @@
               <a:rPr lang="en-US" b="0" dirty="0"/>
               <a:t>’</a:t>
             </a:r>
-          </a:p>
-          <a:p>
-            <a:endParaRPr lang="en-US" sz="1200" b="0" kern="1200" dirty="0">
-              <a:solidFill>
-                <a:schemeClr val="tx1"/>
-              </a:solidFill>
-              <a:effectLst/>
-              <a:latin typeface="Arial" charset="0"/>
-              <a:ea typeface="+mn-ea"/>
-              <a:cs typeface="+mn-cs"/>
-            </a:endParaRPr>
-          </a:p>
-          <a:p>
-            <a:pPr marL="0" marR="0" lvl="0" indent="0" algn="l" defTabSz="914400" rtl="0" eaLnBrk="0" fontAlgn="base" latinLnBrk="0" hangingPunct="0">
-              <a:lnSpc>
-                <a:spcPct val="100000"/>
-              </a:lnSpc>
-              <a:spcBef>
-                <a:spcPct val="30000"/>
-              </a:spcBef>
-              <a:spcAft>
-                <a:spcPct val="0"/>
-              </a:spcAft>
-              <a:buClrTx/>
-              <a:buSzTx/>
-              <a:buFontTx/>
-              <a:buNone/>
-              <a:tabLst/>
-              <a:defRPr/>
-            </a:pPr>
-            <a:r>
-              <a:rPr lang="en-US" sz="1200" b="0" dirty="0" err="1"/>
-              <a:t>RandomForest</a:t>
-            </a:r>
-            <a:r>
-              <a:rPr lang="en-US" sz="1200" b="0" dirty="0"/>
-              <a:t> classifier has an 88% accuracy rate for predicting booking cancellations.</a:t>
-            </a:r>
-          </a:p>
-          <a:p>
-            <a:endParaRPr lang="en-US" b="0" dirty="0"/>
           </a:p>
         </p:txBody>
       </p:sp>
@@ -3558,7 +4494,7 @@
           <a:lstStyle/>
           <a:p>
             <a:r>
-              <a:rPr lang="en-US" sz="1200" b="1" i="0" kern="1200" dirty="0">
+              <a:rPr lang="en-US" sz="1200" b="0" i="0" kern="1200" dirty="0">
                 <a:solidFill>
                   <a:schemeClr val="tx1"/>
                 </a:solidFill>
@@ -3567,10 +4503,35 @@
                 <a:ea typeface="+mn-ea"/>
                 <a:cs typeface="+mn-cs"/>
               </a:rPr>
-              <a:t>Resource – Nov 2016| </a:t>
-            </a:r>
-            <a:r>
-              <a:rPr lang="en-US" sz="1200" b="1" i="0" kern="1200" dirty="0">
+              <a:t>With a global average of 24% cancellation rate, this trend produces a very negative impact on hotel revenue and distribution management strategies.</a:t>
+            </a:r>
+          </a:p>
+          <a:p>
+            <a:endParaRPr lang="en-US" sz="1200" b="0" i="0" kern="1200" dirty="0">
+              <a:solidFill>
+                <a:schemeClr val="tx1"/>
+              </a:solidFill>
+              <a:effectLst/>
+              <a:latin typeface="Arial" charset="0"/>
+              <a:ea typeface="+mn-ea"/>
+              <a:cs typeface="+mn-cs"/>
+            </a:endParaRPr>
+          </a:p>
+          <a:p>
+            <a:r>
+              <a:rPr lang="en-US" sz="1200" b="0" i="0" kern="1200" dirty="0">
+                <a:solidFill>
+                  <a:schemeClr val="tx1"/>
+                </a:solidFill>
+                <a:effectLst/>
+                <a:latin typeface="Arial" charset="0"/>
+                <a:ea typeface="+mn-ea"/>
+                <a:cs typeface="+mn-cs"/>
+              </a:rPr>
+              <a:t>Nearly </a:t>
+            </a:r>
+            <a:r>
+              <a:rPr lang="en-US" sz="1200" b="0" i="0" kern="1200" dirty="0">
                 <a:solidFill>
                   <a:schemeClr val="tx1"/>
                 </a:solidFill>
@@ -3586,30 +4547,8 @@
                   </a:extLst>
                 </a:hlinkClick>
               </a:rPr>
-              <a:t>http://blog.experience-hotel.com/an-analysis-of-where-cancellations-come-from/</a:t>
-            </a:r>
-            <a:endParaRPr lang="en-US" sz="1200" b="1" i="0" kern="1200" dirty="0">
-              <a:solidFill>
-                <a:schemeClr val="tx1"/>
-              </a:solidFill>
-              <a:effectLst/>
-              <a:latin typeface="Arial" charset="0"/>
-              <a:ea typeface="+mn-ea"/>
-              <a:cs typeface="+mn-cs"/>
-            </a:endParaRPr>
-          </a:p>
-          <a:p>
-            <a:endParaRPr lang="en-US" sz="1200" b="0" i="0" kern="1200" dirty="0">
-              <a:solidFill>
-                <a:schemeClr val="tx1"/>
-              </a:solidFill>
-              <a:effectLst/>
-              <a:latin typeface="Arial" charset="0"/>
-              <a:ea typeface="+mn-ea"/>
-              <a:cs typeface="+mn-cs"/>
-            </a:endParaRPr>
-          </a:p>
-          <a:p>
+              <a:t>37 percent </a:t>
+            </a:r>
             <a:r>
               <a:rPr lang="en-US" sz="1200" b="0" i="0" kern="1200" dirty="0">
                 <a:solidFill>
@@ -3620,19 +4559,8 @@
                 <a:ea typeface="+mn-ea"/>
                 <a:cs typeface="+mn-cs"/>
               </a:rPr>
-              <a:t>With a global average of 24% cancellation rate, this trend produces a very negative impact on hotel revenue and distribution management strategies.</a:t>
-            </a:r>
-          </a:p>
-          <a:p>
-            <a:endParaRPr lang="en-US" sz="1200" b="0" i="0" kern="1200" dirty="0">
-              <a:solidFill>
-                <a:schemeClr val="tx1"/>
-              </a:solidFill>
-              <a:effectLst/>
-              <a:latin typeface="Arial" charset="0"/>
-              <a:ea typeface="+mn-ea"/>
-              <a:cs typeface="+mn-cs"/>
-            </a:endParaRPr>
+              <a:t>of on-the-books revenue is canceled before arrival. “On the books” is a measure used when looking ahead to see how occupancy or revenue is booked in at a hotel. The amount that is ”on-the-books” will change as more reservations and cancellations occur until the date or period is arrived at, so it is a measure of a moment in time.</a:t>
+            </a:r>
           </a:p>
           <a:p>
             <a:r>
@@ -3645,7 +4573,21 @@
                 <a:ea typeface="+mn-ea"/>
                 <a:cs typeface="+mn-cs"/>
               </a:rPr>
-              <a:t>Nearly </a:t>
+              <a:t>---</a:t>
+            </a:r>
+          </a:p>
+          <a:p>
+            <a:r>
+              <a:rPr lang="en-US" sz="1200" b="0" i="0" kern="1200" dirty="0">
+                <a:solidFill>
+                  <a:schemeClr val="tx1"/>
+                </a:solidFill>
+                <a:effectLst/>
+                <a:latin typeface="Arial" charset="0"/>
+                <a:ea typeface="+mn-ea"/>
+                <a:cs typeface="+mn-cs"/>
+              </a:rPr>
+              <a:t>Note: Resource – Nov 2016| </a:t>
             </a:r>
             <a:r>
               <a:rPr lang="en-US" sz="1200" b="0" i="0" kern="1200" dirty="0">
@@ -3664,103 +4606,7 @@
                   </a:extLst>
                 </a:hlinkClick>
               </a:rPr>
-              <a:t>37 percent </a:t>
-            </a:r>
-            <a:r>
-              <a:rPr lang="en-US" sz="1200" b="0" i="0" kern="1200" dirty="0">
-                <a:solidFill>
-                  <a:schemeClr val="tx1"/>
-                </a:solidFill>
-                <a:effectLst/>
-                <a:latin typeface="Arial" charset="0"/>
-                <a:ea typeface="+mn-ea"/>
-                <a:cs typeface="+mn-cs"/>
-              </a:rPr>
-              <a:t>of on-the-books revenue is canceled before arrival. </a:t>
-            </a:r>
-            <a:r>
-              <a:rPr lang="en-US" sz="1200" b="1" i="0" kern="1200" dirty="0">
-                <a:solidFill>
-                  <a:schemeClr val="tx1"/>
-                </a:solidFill>
-                <a:effectLst/>
-                <a:latin typeface="Arial" charset="0"/>
-                <a:ea typeface="+mn-ea"/>
-                <a:cs typeface="+mn-cs"/>
-              </a:rPr>
-              <a:t>On the books</a:t>
-            </a:r>
-            <a:r>
-              <a:rPr lang="en-US" sz="1200" b="0" i="0" kern="1200" dirty="0">
-                <a:solidFill>
-                  <a:schemeClr val="tx1"/>
-                </a:solidFill>
-                <a:effectLst/>
-                <a:latin typeface="Arial" charset="0"/>
-                <a:ea typeface="+mn-ea"/>
-                <a:cs typeface="+mn-cs"/>
-              </a:rPr>
-              <a:t> is a measure used when looking ahead to see how occupancy or </a:t>
-            </a:r>
-            <a:r>
-              <a:rPr lang="en-US" sz="1200" b="1" i="0" kern="1200" dirty="0">
-                <a:solidFill>
-                  <a:schemeClr val="tx1"/>
-                </a:solidFill>
-                <a:effectLst/>
-                <a:latin typeface="Arial" charset="0"/>
-                <a:ea typeface="+mn-ea"/>
-                <a:cs typeface="+mn-cs"/>
-              </a:rPr>
-              <a:t>revenue</a:t>
-            </a:r>
-            <a:r>
-              <a:rPr lang="en-US" sz="1200" b="0" i="0" kern="1200" dirty="0">
-                <a:solidFill>
-                  <a:schemeClr val="tx1"/>
-                </a:solidFill>
-                <a:effectLst/>
-                <a:latin typeface="Arial" charset="0"/>
-                <a:ea typeface="+mn-ea"/>
-                <a:cs typeface="+mn-cs"/>
-              </a:rPr>
-              <a:t> is booked in at a hotel. The amount that is </a:t>
-            </a:r>
-            <a:r>
-              <a:rPr lang="en-US" sz="1200" b="1" i="0" kern="1200" dirty="0">
-                <a:solidFill>
-                  <a:schemeClr val="tx1"/>
-                </a:solidFill>
-                <a:effectLst/>
-                <a:latin typeface="Arial" charset="0"/>
-                <a:ea typeface="+mn-ea"/>
-                <a:cs typeface="+mn-cs"/>
-              </a:rPr>
-              <a:t>on the books</a:t>
-            </a:r>
-            <a:r>
-              <a:rPr lang="en-US" sz="1200" b="0" i="0" kern="1200" dirty="0">
-                <a:solidFill>
-                  <a:schemeClr val="tx1"/>
-                </a:solidFill>
-                <a:effectLst/>
-                <a:latin typeface="Arial" charset="0"/>
-                <a:ea typeface="+mn-ea"/>
-                <a:cs typeface="+mn-cs"/>
-              </a:rPr>
-              <a:t> will change as more reservations and cancellations occur until the date or period is arrived at, so it is a measure of a </a:t>
-            </a:r>
-            <a:r>
-              <a:rPr lang="en-US" sz="1200" b="0" i="0" kern="1200" dirty="0" err="1">
-                <a:solidFill>
-                  <a:schemeClr val="tx1"/>
-                </a:solidFill>
-                <a:effectLst/>
-                <a:latin typeface="Arial" charset="0"/>
-                <a:ea typeface="+mn-ea"/>
-                <a:cs typeface="+mn-cs"/>
-              </a:rPr>
-              <a:t>mo</a:t>
+              <a:t>http://blog.experience-hotel.com/an-analysis-of-where-cancellations-come-from/</a:t>
             </a:r>
             <a:endParaRPr lang="en-US" sz="1200" b="0" i="0" kern="1200" dirty="0">
               <a:solidFill>
@@ -3773,30 +4619,26 @@
             </a:endParaRPr>
           </a:p>
           <a:p>
-            <a:r>
-              <a:rPr lang="en-US" sz="1200" b="0" i="0" kern="1200" dirty="0" err="1">
-                <a:solidFill>
-                  <a:schemeClr val="tx1"/>
-                </a:solidFill>
-                <a:effectLst/>
-                <a:latin typeface="Arial" charset="0"/>
-                <a:ea typeface="+mn-ea"/>
-                <a:cs typeface="+mn-cs"/>
-              </a:rPr>
-              <a:t>ment</a:t>
-            </a:r>
-            <a:r>
-              <a:rPr lang="en-US" sz="1200" b="0" i="0" kern="1200" dirty="0">
-                <a:solidFill>
-                  <a:schemeClr val="tx1"/>
-                </a:solidFill>
-                <a:effectLst/>
-                <a:latin typeface="Arial" charset="0"/>
-                <a:ea typeface="+mn-ea"/>
-                <a:cs typeface="+mn-cs"/>
-              </a:rPr>
-              <a:t> in time.</a:t>
-            </a:r>
+            <a:endParaRPr lang="en-US" sz="1200" b="0" i="0" kern="1200" dirty="0">
+              <a:solidFill>
+                <a:schemeClr val="tx1"/>
+              </a:solidFill>
+              <a:effectLst/>
+              <a:latin typeface="Arial" charset="0"/>
+              <a:ea typeface="+mn-ea"/>
+              <a:cs typeface="+mn-cs"/>
+            </a:endParaRPr>
+          </a:p>
+          <a:p>
+            <a:endParaRPr lang="en-US" sz="1200" b="0" i="0" kern="1200" dirty="0">
+              <a:solidFill>
+                <a:schemeClr val="tx1"/>
+              </a:solidFill>
+              <a:effectLst/>
+              <a:latin typeface="Arial" charset="0"/>
+              <a:ea typeface="+mn-ea"/>
+              <a:cs typeface="+mn-cs"/>
+            </a:endParaRPr>
           </a:p>
         </p:txBody>
       </p:sp>
@@ -3870,7 +4712,15 @@
             </a:pPr>
             <a:r>
               <a:rPr lang="en-US" sz="1200" b="0" dirty="0"/>
-              <a:t>Revenue lost from cancellations per year averages 5 million dollars.</a:t>
+              <a:t>Revenue lost from cancellations per year averages 5 million dollars.  13% = </a:t>
+            </a:r>
+            <a:r>
+              <a:rPr lang="en-US" sz="1200" b="1" dirty="0"/>
+              <a:t>$650K </a:t>
+            </a:r>
+            <a:r>
+              <a:rPr lang="en-US" sz="1200" b="0" dirty="0"/>
+              <a:t>saving/year in Euros.</a:t>
             </a:r>
           </a:p>
           <a:p>
@@ -3898,7 +4748,7 @@
     </p:spTree>
     <p:extLst>
       <p:ext uri="{BB962C8B-B14F-4D97-AF65-F5344CB8AC3E}">
-        <p14:creationId xmlns:p14="http://schemas.microsoft.com/office/powerpoint/2010/main" val="2699173360"/>
+        <p14:creationId xmlns:p14="http://schemas.microsoft.com/office/powerpoint/2010/main" val="240794019"/>
       </p:ext>
     </p:extLst>
   </p:cSld>
@@ -3957,53 +4807,69 @@
             </a:endParaRPr>
           </a:p>
           <a:p>
-            <a:r>
-              <a:rPr lang="en-US" dirty="0"/>
+            <a:pPr marL="171450" indent="-171450">
+              <a:buFont typeface="Arial" panose="020B0604020202020204" pitchFamily="34" charset="0"/>
+              <a:buChar char="•"/>
+            </a:pPr>
+            <a:r>
+              <a:rPr lang="en-US" b="0" dirty="0"/>
               <a:t>PRT </a:t>
             </a:r>
             <a:r>
-              <a:rPr lang="en-US" dirty="0">
+              <a:rPr lang="en-US" b="0" dirty="0">
                 <a:effectLst/>
               </a:rPr>
-              <a:t>21071.0	27519.0</a:t>
-            </a:r>
-          </a:p>
-          <a:p>
-            <a:r>
-              <a:rPr lang="en-US" dirty="0"/>
+              <a:t>	27519.0</a:t>
+            </a:r>
+          </a:p>
+          <a:p>
+            <a:pPr marL="171450" indent="-171450">
+              <a:buFont typeface="Arial" panose="020B0604020202020204" pitchFamily="34" charset="0"/>
+              <a:buChar char="•"/>
+            </a:pPr>
+            <a:r>
+              <a:rPr lang="en-US" b="0" dirty="0"/>
               <a:t>GBR </a:t>
             </a:r>
             <a:r>
-              <a:rPr lang="en-US" dirty="0">
+              <a:rPr lang="en-US" b="0" dirty="0">
                 <a:effectLst/>
               </a:rPr>
-              <a:t>9676.0	2453.0</a:t>
-            </a:r>
-          </a:p>
-          <a:p>
-            <a:r>
-              <a:rPr lang="en-US" dirty="0"/>
+              <a:t>	2453.0</a:t>
+            </a:r>
+          </a:p>
+          <a:p>
+            <a:pPr marL="171450" indent="-171450">
+              <a:buFont typeface="Arial" panose="020B0604020202020204" pitchFamily="34" charset="0"/>
+              <a:buChar char="•"/>
+            </a:pPr>
+            <a:r>
+              <a:rPr lang="en-US" b="0" dirty="0"/>
               <a:t>ESP </a:t>
             </a:r>
             <a:r>
-              <a:rPr lang="en-US" dirty="0">
+              <a:rPr lang="en-US" b="0" dirty="0">
                 <a:effectLst/>
               </a:rPr>
-              <a:t>6391.0	2177.0</a:t>
-            </a:r>
-          </a:p>
-          <a:p>
-            <a:r>
-              <a:rPr lang="en-US" dirty="0"/>
+              <a:t>	2177.0</a:t>
+            </a:r>
+          </a:p>
+          <a:p>
+            <a:pPr marL="171450" indent="-171450">
+              <a:buFont typeface="Arial" panose="020B0604020202020204" pitchFamily="34" charset="0"/>
+              <a:buChar char="•"/>
+            </a:pPr>
+            <a:r>
+              <a:rPr lang="en-US" b="0" dirty="0"/>
               <a:t>FRA </a:t>
             </a:r>
             <a:r>
-              <a:rPr lang="en-US" dirty="0">
+              <a:rPr lang="en-US" b="0" dirty="0">
                 <a:effectLst/>
               </a:rPr>
-              <a:t>8481.0	1934.0</a:t>
-            </a:r>
-            <a:endParaRPr lang="en-US" dirty="0"/>
+              <a:t>	1934.0</a:t>
+            </a:r>
+            <a:endParaRPr lang="en-US" b="0" dirty="0"/>
           </a:p>
         </p:txBody>
       </p:sp>
@@ -4084,7 +4950,29 @@
                 <a:ea typeface="+mn-ea"/>
                 <a:cs typeface="+mn-cs"/>
               </a:rPr>
-              <a:t>Most of the cancellations are from “Online TA” with 47%, which is 7% higher than the industry rate at 40%.</a:t>
+              <a:t>Most of the cancellations are from “Online TA” with 47%, which is </a:t>
+            </a:r>
+            <a:r>
+              <a:rPr lang="en-US" sz="1200" b="1" kern="0" dirty="0">
+                <a:solidFill>
+                  <a:schemeClr val="tx1"/>
+                </a:solidFill>
+                <a:latin typeface="Arial" charset="0"/>
+                <a:ea typeface="+mn-ea"/>
+                <a:cs typeface="+mn-cs"/>
+              </a:rPr>
+              <a:t>7% higher </a:t>
+            </a:r>
+            <a:r>
+              <a:rPr lang="en-US" sz="1200" b="0" kern="0" dirty="0">
+                <a:solidFill>
+                  <a:schemeClr val="tx1"/>
+                </a:solidFill>
+                <a:latin typeface="Arial" charset="0"/>
+                <a:ea typeface="+mn-ea"/>
+                <a:cs typeface="+mn-cs"/>
+              </a:rPr>
+              <a:t>than the industry rate at 40%.</a:t>
             </a:r>
           </a:p>
           <a:p>
@@ -4188,10 +5076,10 @@
                 <a:ea typeface="+mn-ea"/>
                 <a:cs typeface="+mn-cs"/>
               </a:rPr>
-              <a:t>Guests have become accustomed to free cancellation policies that have been made popular (and encouraged) by mainly Booking.com and channels and apps such as </a:t>
-            </a:r>
-            <a:r>
-              <a:rPr lang="en-US" sz="1200" b="0" i="0" kern="1200" dirty="0" err="1">
+              <a:t>Guests have become accustomed to “</a:t>
+            </a:r>
+            <a:r>
+              <a:rPr lang="en-US" sz="1200" b="1" i="0" kern="1200" dirty="0">
                 <a:solidFill>
                   <a:schemeClr val="tx1"/>
                 </a:solidFill>
@@ -4200,7 +5088,7 @@
                 <a:ea typeface="+mn-ea"/>
                 <a:cs typeface="+mn-cs"/>
               </a:rPr>
-              <a:t>Tingo</a:t>
+              <a:t>free cancellation</a:t>
             </a:r>
             <a:r>
               <a:rPr lang="en-US" sz="1200" b="0" i="0" kern="1200" dirty="0">
@@ -4212,7 +5100,79 @@
                 <a:ea typeface="+mn-ea"/>
                 <a:cs typeface="+mn-cs"/>
               </a:rPr>
-              <a:t> or Service, designed to cancel and rebook hotel rooms at each rate drop.</a:t>
+              <a:t>” policies that have been made popular (and encouraged) by mainly </a:t>
+            </a:r>
+            <a:r>
+              <a:rPr lang="en-US" sz="1200" b="0" i="0" u="sng" kern="1200" dirty="0">
+                <a:solidFill>
+                  <a:schemeClr val="tx1"/>
+                </a:solidFill>
+                <a:effectLst/>
+                <a:latin typeface="Arial" charset="0"/>
+                <a:ea typeface="+mn-ea"/>
+                <a:cs typeface="+mn-cs"/>
+              </a:rPr>
+              <a:t>Booking.com </a:t>
+            </a:r>
+            <a:r>
+              <a:rPr lang="en-US" sz="1200" b="0" i="0" kern="1200" dirty="0">
+                <a:solidFill>
+                  <a:schemeClr val="tx1"/>
+                </a:solidFill>
+                <a:effectLst/>
+                <a:latin typeface="Arial" charset="0"/>
+                <a:ea typeface="+mn-ea"/>
+                <a:cs typeface="+mn-cs"/>
+              </a:rPr>
+              <a:t>and channels and apps such as </a:t>
+            </a:r>
+            <a:r>
+              <a:rPr lang="en-US" sz="1200" b="0" i="0" kern="1200" dirty="0" err="1">
+                <a:solidFill>
+                  <a:schemeClr val="tx1"/>
+                </a:solidFill>
+                <a:effectLst/>
+                <a:latin typeface="Arial" charset="0"/>
+                <a:ea typeface="+mn-ea"/>
+                <a:cs typeface="+mn-cs"/>
+              </a:rPr>
+              <a:t>Tingo</a:t>
+            </a:r>
+            <a:r>
+              <a:rPr lang="en-US" sz="1200" b="0" i="0" kern="1200" dirty="0">
+                <a:solidFill>
+                  <a:schemeClr val="tx1"/>
+                </a:solidFill>
+                <a:effectLst/>
+                <a:latin typeface="Arial" charset="0"/>
+                <a:ea typeface="+mn-ea"/>
+                <a:cs typeface="+mn-cs"/>
+              </a:rPr>
+              <a:t> or Service, </a:t>
+            </a:r>
+            <a:r>
+              <a:rPr lang="en-US" sz="1200" b="1" i="0" kern="1200" dirty="0">
+                <a:solidFill>
+                  <a:schemeClr val="tx1"/>
+                </a:solidFill>
+                <a:effectLst/>
+                <a:latin typeface="Arial" charset="0"/>
+                <a:ea typeface="+mn-ea"/>
+                <a:cs typeface="+mn-cs"/>
+              </a:rPr>
+              <a:t>designed to cancel and rebook hotel rooms at each rate drop</a:t>
+            </a:r>
+            <a:r>
+              <a:rPr lang="en-US" sz="1200" b="0" i="0" kern="1200" dirty="0">
+                <a:solidFill>
+                  <a:schemeClr val="tx1"/>
+                </a:solidFill>
+                <a:effectLst/>
+                <a:latin typeface="Arial" charset="0"/>
+                <a:ea typeface="+mn-ea"/>
+                <a:cs typeface="+mn-cs"/>
+              </a:rPr>
+              <a:t>.</a:t>
             </a:r>
             <a:br>
               <a:rPr lang="en-US" dirty="0"/>
@@ -4230,7 +5190,31 @@
                 <a:ea typeface="+mn-ea"/>
                 <a:cs typeface="+mn-cs"/>
               </a:rPr>
-              <a:t>This customer behavior hinders accurate forecasting, eventually resulting in non-optimized occupancy. Other factors come into play with cancellation rate increased but we believe none are as pervasive as the increased </a:t>
+              <a:t>This customer behavior </a:t>
+            </a:r>
+            <a:r>
+              <a:rPr lang="en-US" sz="1200" b="1" i="0" kern="1200" dirty="0">
+                <a:solidFill>
+                  <a:schemeClr val="tx1"/>
+                </a:solidFill>
+                <a:effectLst/>
+                <a:latin typeface="Arial" charset="0"/>
+                <a:ea typeface="+mn-ea"/>
+                <a:cs typeface="+mn-cs"/>
+              </a:rPr>
+              <a:t>hinders accurate forecasting, eventually resulting in non-optimized occupancy</a:t>
+            </a:r>
+            <a:r>
+              <a:rPr lang="en-US" sz="1200" b="0" i="0" kern="1200" dirty="0">
+                <a:solidFill>
+                  <a:schemeClr val="tx1"/>
+                </a:solidFill>
+                <a:effectLst/>
+                <a:latin typeface="Arial" charset="0"/>
+                <a:ea typeface="+mn-ea"/>
+                <a:cs typeface="+mn-cs"/>
+              </a:rPr>
+              <a:t>. Other factors come into play with cancellation rate increased but we believe none are as pervasive as the increased </a:t>
             </a:r>
             <a:r>
               <a:rPr lang="en-US" sz="1200" b="0" i="0" kern="1200" dirty="0" err="1">
@@ -4317,6 +5301,47 @@
           <a:bodyPr/>
           <a:lstStyle/>
           <a:p>
+            <a:pPr marL="0" marR="0" lvl="0" indent="0" algn="l" defTabSz="914400" rtl="0" eaLnBrk="0" fontAlgn="base" latinLnBrk="0" hangingPunct="0">
+              <a:lnSpc>
+                <a:spcPct val="100000"/>
+              </a:lnSpc>
+              <a:spcBef>
+                <a:spcPct val="30000"/>
+              </a:spcBef>
+              <a:spcAft>
+                <a:spcPct val="0"/>
+              </a:spcAft>
+              <a:buClrTx/>
+              <a:buSzTx/>
+              <a:buFont typeface="Arial" panose="020B0604020202020204" pitchFamily="34" charset="0"/>
+              <a:buNone/>
+              <a:tabLst/>
+              <a:defRPr/>
+            </a:pPr>
+            <a:r>
+              <a:rPr lang="en-US" b="0" dirty="0"/>
+              <a:t>Longer than 30 days are </a:t>
+            </a:r>
+            <a:r>
+              <a:rPr lang="en-US" sz="1800" b="0" dirty="0"/>
+              <a:t>85%</a:t>
+            </a:r>
+            <a:r>
+              <a:rPr lang="en-US" b="0" dirty="0"/>
+              <a:t> more likely to be canceled.  </a:t>
+            </a:r>
+            <a:r>
+              <a:rPr lang="en-US" sz="1200" b="0" i="0" kern="1200" dirty="0">
+                <a:solidFill>
+                  <a:schemeClr val="tx1"/>
+                </a:solidFill>
+                <a:effectLst/>
+                <a:latin typeface="Arial" charset="0"/>
+                <a:ea typeface="+mn-ea"/>
+                <a:cs typeface="+mn-cs"/>
+              </a:rPr>
+              <a:t>Cancellation Percentage: 0-6 days = 2.5 % more than 30 days 85%.</a:t>
+            </a:r>
             <a:endParaRPr lang="en-US" dirty="0"/>
           </a:p>
         </p:txBody>
@@ -8189,14 +9214,14 @@
           <p:nvPr>
             <p:extLst>
               <p:ext uri="{D42A27DB-BD31-4B8C-83A1-F6EECF244321}">
-                <p14:modId xmlns:p14="http://schemas.microsoft.com/office/powerpoint/2010/main" val="4046403176"/>
+                <p14:modId xmlns:p14="http://schemas.microsoft.com/office/powerpoint/2010/main" val="1222808641"/>
               </p:ext>
             </p:extLst>
           </p:nvPr>
         </p:nvGraphicFramePr>
         <p:xfrm>
           <a:off x="4645025" y="1619320"/>
-          <a:ext cx="4041776" cy="3233597"/>
+          <a:ext cx="4041776" cy="4355887"/>
         </p:xfrm>
         <a:graphic>
           <a:graphicData uri="http://schemas.openxmlformats.org/drawingml/2006/table">
@@ -8532,7 +9557,7 @@
                     <a:lstStyle/>
                     <a:p>
                       <a:r>
-                        <a:rPr lang="en-US" sz="1600" cap="none" spc="0">
+                        <a:rPr lang="en-US" sz="1600" cap="none" spc="0" dirty="0">
                           <a:solidFill>
                             <a:schemeClr val="tx1">
                               <a:lumMod val="75000"/>
@@ -8540,7 +9565,7 @@
                             </a:schemeClr>
                           </a:solidFill>
                         </a:rPr>
-                        <a:t>Precision (Micro Avg)</a:t>
+                        <a:t>Precision</a:t>
                       </a:r>
                     </a:p>
                   </a:txBody>
@@ -8579,7 +9604,7 @@
                     <a:p>
                       <a:pPr algn="ctr"/>
                       <a:r>
-                        <a:rPr lang="en-US" sz="1600" b="1" cap="none" spc="0">
+                        <a:rPr lang="en-US" sz="1600" b="1" cap="none" spc="0" dirty="0">
                           <a:solidFill>
                             <a:schemeClr val="tx1">
                               <a:lumMod val="75000"/>
@@ -8589,7 +9614,7 @@
                         </a:rPr>
                         <a:t>87%</a:t>
                       </a:r>
-                      <a:endParaRPr lang="en-US" sz="1600" cap="none" spc="0">
+                      <a:endParaRPr lang="en-US" sz="1600" cap="none" spc="0" dirty="0">
                         <a:solidFill>
                           <a:schemeClr val="tx1">
                             <a:lumMod val="75000"/>
@@ -8672,6 +9697,9 @@
                         <a:srgbClr val="FFFFFF"/>
                       </a:solidFill>
                       <a:prstDash val="solid"/>
+                      <a:round/>
+                      <a:headEnd type="none" w="med" len="med"/>
+                      <a:tailEnd type="none" w="med" len="med"/>
                     </a:lnB>
                     <a:solidFill>
                       <a:srgbClr val="B4BCBE">
@@ -8743,6 +9771,9 @@
                         <a:srgbClr val="FFFFFF"/>
                       </a:solidFill>
                       <a:prstDash val="solid"/>
+                      <a:round/>
+                      <a:headEnd type="none" w="med" len="med"/>
+                      <a:tailEnd type="none" w="med" len="med"/>
                     </a:lnB>
                     <a:solidFill>
                       <a:srgbClr val="B4BCBE">
@@ -8754,6 +9785,264 @@
                 <a:extLst>
                   <a:ext uri="{0D108BD9-81ED-4DB2-BD59-A6C34878D82A}">
                     <a16:rowId xmlns:a16="http://schemas.microsoft.com/office/drawing/2014/main" val="2401809299"/>
+                  </a:ext>
+                </a:extLst>
+              </a:tr>
+              <a:tr h="561145">
+                <a:tc>
+                  <a:txBody>
+                    <a:bodyPr/>
+                    <a:lstStyle/>
+                    <a:p>
+                      <a:pPr marL="0" algn="l" defTabSz="914400" rtl="0" eaLnBrk="1" latinLnBrk="0" hangingPunct="1"/>
+                      <a:r>
+                        <a:rPr lang="en-US" sz="1600" kern="1200" cap="none" spc="0" dirty="0">
+                          <a:solidFill>
+                            <a:schemeClr val="tx1">
+                              <a:lumMod val="75000"/>
+                              <a:lumOff val="25000"/>
+                            </a:schemeClr>
+                          </a:solidFill>
+                          <a:latin typeface="+mn-lt"/>
+                          <a:ea typeface="+mn-ea"/>
+                          <a:cs typeface="+mn-cs"/>
+                        </a:rPr>
+                        <a:t>Sensitivity (Recall)</a:t>
+                      </a:r>
+                    </a:p>
+                  </a:txBody>
+                  <a:tcPr marL="263036" marR="136779" marT="136779" marB="136779">
+                    <a:lnL w="12700" cmpd="sng">
+                      <a:noFill/>
+                      <a:prstDash val="solid"/>
+                    </a:lnL>
+                    <a:lnR w="12700" cmpd="sng">
+                      <a:noFill/>
+                      <a:prstDash val="solid"/>
+                    </a:lnR>
+                    <a:lnT w="19050" cap="flat" cmpd="sng" algn="ctr">
+                      <a:solidFill>
+                        <a:srgbClr val="FFFFFF"/>
+                      </a:solidFill>
+                      <a:prstDash val="solid"/>
+                      <a:round/>
+                      <a:headEnd type="none" w="med" len="med"/>
+                      <a:tailEnd type="none" w="med" len="med"/>
+                    </a:lnT>
+                    <a:lnB w="19050" cap="flat" cmpd="sng" algn="ctr">
+                      <a:solidFill>
+                        <a:srgbClr val="FFFFFF"/>
+                      </a:solidFill>
+                      <a:prstDash val="solid"/>
+                      <a:round/>
+                      <a:headEnd type="none" w="med" len="med"/>
+                      <a:tailEnd type="none" w="med" len="med"/>
+                    </a:lnB>
+                    <a:solidFill>
+                      <a:srgbClr val="B4BCBE">
+                        <a:alpha val="34902"/>
+                      </a:srgbClr>
+                    </a:solidFill>
+                  </a:tcPr>
+                </a:tc>
+                <a:tc>
+                  <a:txBody>
+                    <a:bodyPr/>
+                    <a:lstStyle/>
+                    <a:p>
+                      <a:pPr marL="0" marR="0" lvl="0" indent="0" algn="ctr" defTabSz="914400" rtl="0" eaLnBrk="1" fontAlgn="auto" latinLnBrk="0" hangingPunct="1">
+                        <a:lnSpc>
+                          <a:spcPct val="100000"/>
+                        </a:lnSpc>
+                        <a:spcBef>
+                          <a:spcPts val="0"/>
+                        </a:spcBef>
+                        <a:spcAft>
+                          <a:spcPts val="0"/>
+                        </a:spcAft>
+                        <a:buClrTx/>
+                        <a:buSzTx/>
+                        <a:buFontTx/>
+                        <a:buNone/>
+                        <a:tabLst/>
+                        <a:defRPr/>
+                      </a:pPr>
+                      <a:r>
+                        <a:rPr lang="en-US" sz="1600" b="1" kern="1200" cap="none" spc="0" dirty="0">
+                          <a:solidFill>
+                            <a:schemeClr val="tx1">
+                              <a:lumMod val="75000"/>
+                              <a:lumOff val="25000"/>
+                            </a:schemeClr>
+                          </a:solidFill>
+                          <a:latin typeface="+mn-lt"/>
+                          <a:ea typeface="+mn-ea"/>
+                          <a:cs typeface="+mn-cs"/>
+                        </a:rPr>
+                        <a:t>81%</a:t>
+                      </a:r>
+                    </a:p>
+                  </a:txBody>
+                  <a:tcPr marL="263036" marR="136779" marT="136779" marB="136779">
+                    <a:lnL w="12700" cmpd="sng">
+                      <a:noFill/>
+                      <a:prstDash val="solid"/>
+                    </a:lnL>
+                    <a:lnR w="12700" cmpd="sng">
+                      <a:noFill/>
+                      <a:prstDash val="solid"/>
+                    </a:lnR>
+                    <a:lnT w="19050" cap="flat" cmpd="sng" algn="ctr">
+                      <a:solidFill>
+                        <a:srgbClr val="FFFFFF"/>
+                      </a:solidFill>
+                      <a:prstDash val="solid"/>
+                      <a:round/>
+                      <a:headEnd type="none" w="med" len="med"/>
+                      <a:tailEnd type="none" w="med" len="med"/>
+                    </a:lnT>
+                    <a:lnB w="19050" cap="flat" cmpd="sng" algn="ctr">
+                      <a:solidFill>
+                        <a:srgbClr val="FFFFFF"/>
+                      </a:solidFill>
+                      <a:prstDash val="solid"/>
+                      <a:round/>
+                      <a:headEnd type="none" w="med" len="med"/>
+                      <a:tailEnd type="none" w="med" len="med"/>
+                    </a:lnB>
+                    <a:solidFill>
+                      <a:srgbClr val="B4BCBE">
+                        <a:alpha val="34902"/>
+                      </a:srgbClr>
+                    </a:solidFill>
+                  </a:tcPr>
+                </a:tc>
+                <a:extLst>
+                  <a:ext uri="{0D108BD9-81ED-4DB2-BD59-A6C34878D82A}">
+                    <a16:rowId xmlns:a16="http://schemas.microsoft.com/office/drawing/2014/main" val="2024490280"/>
+                  </a:ext>
+                </a:extLst>
+              </a:tr>
+              <a:tr h="561145">
+                <a:tc>
+                  <a:txBody>
+                    <a:bodyPr/>
+                    <a:lstStyle/>
+                    <a:p>
+                      <a:pPr marL="0" algn="l" defTabSz="914400" rtl="0" eaLnBrk="1" latinLnBrk="0" hangingPunct="1"/>
+                      <a:r>
+                        <a:rPr lang="en-US" sz="1600" kern="1200" cap="none" spc="0" dirty="0">
+                          <a:solidFill>
+                            <a:schemeClr val="tx1">
+                              <a:lumMod val="75000"/>
+                              <a:lumOff val="25000"/>
+                            </a:schemeClr>
+                          </a:solidFill>
+                          <a:latin typeface="+mn-lt"/>
+                          <a:ea typeface="+mn-ea"/>
+                          <a:cs typeface="+mn-cs"/>
+                        </a:rPr>
+                        <a:t>Specificity</a:t>
+                      </a:r>
+                    </a:p>
+                  </a:txBody>
+                  <a:tcPr marL="263036" marR="136779" marT="136779" marB="136779">
+                    <a:lnL w="12700" cmpd="sng">
+                      <a:noFill/>
+                      <a:prstDash val="solid"/>
+                    </a:lnL>
+                    <a:lnR w="12700" cmpd="sng">
+                      <a:noFill/>
+                      <a:prstDash val="solid"/>
+                    </a:lnR>
+                    <a:lnT w="19050" cap="flat" cmpd="sng" algn="ctr">
+                      <a:solidFill>
+                        <a:srgbClr val="FFFFFF"/>
+                      </a:solidFill>
+                      <a:prstDash val="solid"/>
+                    </a:lnT>
+                    <a:lnB w="19050" cap="flat" cmpd="sng" algn="ctr">
+                      <a:solidFill>
+                        <a:srgbClr val="FFFFFF"/>
+                      </a:solidFill>
+                      <a:prstDash val="solid"/>
+                    </a:lnB>
+                    <a:solidFill>
+                      <a:srgbClr val="B4BCBE">
+                        <a:alpha val="34902"/>
+                      </a:srgbClr>
+                    </a:solidFill>
+                  </a:tcPr>
+                </a:tc>
+                <a:tc>
+                  <a:txBody>
+                    <a:bodyPr/>
+                    <a:lstStyle/>
+                    <a:p>
+                      <a:pPr marL="0" marR="0" lvl="0" indent="0" algn="ctr" defTabSz="914400" rtl="0" eaLnBrk="1" fontAlgn="auto" latinLnBrk="0" hangingPunct="1">
+                        <a:lnSpc>
+                          <a:spcPct val="100000"/>
+                        </a:lnSpc>
+                        <a:spcBef>
+                          <a:spcPts val="0"/>
+                        </a:spcBef>
+                        <a:spcAft>
+                          <a:spcPts val="0"/>
+                        </a:spcAft>
+                        <a:buClrTx/>
+                        <a:buSzTx/>
+                        <a:buFontTx/>
+                        <a:buNone/>
+                        <a:tabLst/>
+                        <a:defRPr/>
+                      </a:pPr>
+                      <a:r>
+                        <a:rPr lang="en-US" sz="1600" b="1" kern="1200" cap="none" spc="0" dirty="0">
+                          <a:solidFill>
+                            <a:schemeClr val="tx1">
+                              <a:lumMod val="75000"/>
+                              <a:lumOff val="25000"/>
+                            </a:schemeClr>
+                          </a:solidFill>
+                          <a:latin typeface="+mn-lt"/>
+                          <a:ea typeface="+mn-ea"/>
+                          <a:cs typeface="+mn-cs"/>
+                        </a:rPr>
+                        <a:t>92%</a:t>
+                      </a:r>
+                    </a:p>
+                  </a:txBody>
+                  <a:tcPr marL="263036" marR="136779" marT="136779" marB="136779">
+                    <a:lnL w="12700" cmpd="sng">
+                      <a:noFill/>
+                      <a:prstDash val="solid"/>
+                    </a:lnL>
+                    <a:lnR w="12700" cmpd="sng">
+                      <a:noFill/>
+                      <a:prstDash val="solid"/>
+                    </a:lnR>
+                    <a:lnT w="19050" cap="flat" cmpd="sng" algn="ctr">
+                      <a:solidFill>
+                        <a:srgbClr val="FFFFFF"/>
+                      </a:solidFill>
+                      <a:prstDash val="solid"/>
+                    </a:lnT>
+                    <a:lnB w="19050" cap="flat" cmpd="sng" algn="ctr">
+                      <a:solidFill>
+                        <a:srgbClr val="FFFFFF"/>
+                      </a:solidFill>
+                      <a:prstDash val="solid"/>
+                    </a:lnB>
+                    <a:solidFill>
+                      <a:srgbClr val="B4BCBE">
+                        <a:alpha val="34902"/>
+                      </a:srgbClr>
+                    </a:solidFill>
+                  </a:tcPr>
+                </a:tc>
+                <a:extLst>
+                  <a:ext uri="{0D108BD9-81ED-4DB2-BD59-A6C34878D82A}">
+                    <a16:rowId xmlns:a16="http://schemas.microsoft.com/office/drawing/2014/main" val="3486204543"/>
                   </a:ext>
                 </a:extLst>
               </a:tr>
@@ -8916,8 +10205,8 @@
         </p:nvSpPr>
         <p:spPr bwMode="auto">
           <a:xfrm>
-            <a:off x="4572000" y="1600200"/>
-            <a:ext cx="4362680" cy="4343400"/>
+            <a:off x="4457700" y="1600200"/>
+            <a:ext cx="4476980" cy="4343400"/>
           </a:xfrm>
           <a:prstGeom prst="rect">
             <a:avLst/>
@@ -8961,20 +10250,7 @@
             </a:pPr>
             <a:r>
               <a:rPr lang="en-US" sz="2400" dirty="0"/>
-              <a:t>OTA</a:t>
-            </a:r>
-          </a:p>
-          <a:p>
-            <a:pPr marL="684213" lvl="1" indent="-227013" algn="l" eaLnBrk="0" hangingPunct="0">
-              <a:spcBef>
-                <a:spcPct val="20000"/>
-              </a:spcBef>
-              <a:buFontTx/>
-              <a:buChar char="•"/>
-            </a:pPr>
-            <a:r>
-              <a:rPr lang="en-US" sz="2400" dirty="0"/>
-              <a:t>Direct</a:t>
+              <a:t>OTA  vs  Direct</a:t>
             </a:r>
           </a:p>
           <a:p>
@@ -8988,6 +10264,19 @@
             <a:r>
               <a:rPr lang="en-US" sz="2400" dirty="0"/>
               <a:t>Allow hotel managers to act on bookings with high cancellation probability</a:t>
+            </a:r>
+          </a:p>
+          <a:p>
+            <a:pPr marL="227013" indent="-227013" algn="l" eaLnBrk="0" hangingPunct="0">
+              <a:spcBef>
+                <a:spcPct val="20000"/>
+              </a:spcBef>
+              <a:buFontTx/>
+              <a:buChar char="•"/>
+            </a:pPr>
+            <a:r>
+              <a:rPr lang="en-US" sz="2400" dirty="0"/>
+              <a:t>Improve overbooking and cancellation policies</a:t>
             </a:r>
           </a:p>
           <a:p>
@@ -9226,8 +10515,8 @@
         </p:nvSpPr>
         <p:spPr bwMode="auto">
           <a:xfrm>
-            <a:off x="314324" y="2365514"/>
-            <a:ext cx="8651927" cy="3578086"/>
+            <a:off x="314324" y="3181350"/>
+            <a:ext cx="8651927" cy="2762250"/>
           </a:xfrm>
           <a:prstGeom prst="rect">
             <a:avLst/>
@@ -9255,8 +10544,8 @@
               <a:buChar char="•"/>
             </a:pPr>
             <a:r>
-              <a:rPr lang="en-US" sz="2400" dirty="0"/>
-              <a:t>Perform analysis between the city hotel and resort to gain insights into cancellation behaviors.</a:t>
+              <a:rPr lang="en-US" sz="2200" dirty="0"/>
+              <a:t>Perform analysis between the city hotel and resort separately.</a:t>
             </a:r>
           </a:p>
           <a:p>
@@ -9271,8 +10560,8 @@
               <a:buChar char="•"/>
             </a:pPr>
             <a:r>
-              <a:rPr lang="en-US" sz="2400" dirty="0"/>
-              <a:t>Build a neural network to determine if an increase in accuracy can be achieved from 88% to 90%.</a:t>
+              <a:rPr lang="en-US" sz="2200" dirty="0"/>
+              <a:t>Build a neural network to increase accuracy from 88% to 90%.</a:t>
             </a:r>
           </a:p>
           <a:p>
@@ -9287,8 +10576,8 @@
               <a:buChar char="•"/>
             </a:pPr>
             <a:r>
-              <a:rPr lang="en-US" sz="2400" dirty="0"/>
-              <a:t>Create a GUI to help hotel convert low cancellation probabilities into revenue.</a:t>
+              <a:rPr lang="en-US" sz="2200" dirty="0"/>
+              <a:t>Create a GUI to convert low cancellation probabilities into revenue.</a:t>
             </a:r>
           </a:p>
           <a:p>
@@ -9303,8 +10592,8 @@
               <a:buChar char="•"/>
             </a:pPr>
             <a:r>
-              <a:rPr lang="en-US" sz="2400" dirty="0"/>
-              <a:t>Perform analysis to determine which OTA will serve the hotel business better.</a:t>
+              <a:rPr lang="en-US" sz="2200" dirty="0"/>
+              <a:t>Perform analysis to determine which OTA will serves hotel better.</a:t>
             </a:r>
           </a:p>
           <a:p>
@@ -9319,8 +10608,8 @@
               <a:buChar char="•"/>
             </a:pPr>
             <a:r>
-              <a:rPr lang="en-US" sz="2400" dirty="0"/>
-              <a:t>Analyze data from weather, holidays, events, social reputation, and online prices/inventory.</a:t>
+              <a:rPr lang="en-US" sz="2200" dirty="0"/>
+              <a:t>Analyze data from weather, holidays and online prices/inventory.</a:t>
             </a:r>
           </a:p>
           <a:p>
@@ -9332,7 +10621,7 @@
                 <a:spcPct val="20000"/>
               </a:spcBef>
             </a:pPr>
-            <a:endParaRPr lang="en-US" sz="2400" dirty="0"/>
+            <a:endParaRPr lang="en-US" sz="2200" dirty="0"/>
           </a:p>
         </p:txBody>
       </p:sp>
@@ -9465,8 +10754,8 @@
         </p:blipFill>
         <p:spPr>
           <a:xfrm>
-            <a:off x="635392" y="1063785"/>
-            <a:ext cx="7797800" cy="3306872"/>
+            <a:off x="635392" y="935657"/>
+            <a:ext cx="7797800" cy="3264871"/>
           </a:xfrm>
           <a:prstGeom prst="rect">
             <a:avLst/>
@@ -9501,7 +10790,7 @@
         </p:nvSpPr>
         <p:spPr>
           <a:xfrm>
-            <a:off x="589230" y="4370657"/>
+            <a:off x="589230" y="4200529"/>
             <a:ext cx="7881670" cy="1224951"/>
           </a:xfrm>
           <a:prstGeom prst="rect">
@@ -9541,6 +10830,145 @@
               </a:rPr>
               <a:t>@ Sharonda W</a:t>
             </a:r>
+          </a:p>
+        </p:txBody>
+      </p:sp>
+      <p:sp>
+        <p:nvSpPr>
+          <p:cNvPr id="6" name="TextBox 5">
+            <a:extLst>
+              <a:ext uri="{FF2B5EF4-FFF2-40B4-BE49-F238E27FC236}">
+                <a16:creationId xmlns:a16="http://schemas.microsoft.com/office/drawing/2014/main" id="{95B91CCD-7342-4556-83C6-79817CF10448}"/>
+              </a:ext>
+            </a:extLst>
+          </p:cNvPr>
+          <p:cNvSpPr txBox="1"/>
+          <p:nvPr/>
+        </p:nvSpPr>
+        <p:spPr>
+          <a:xfrm>
+            <a:off x="631165" y="5543776"/>
+            <a:ext cx="7881670" cy="369332"/>
+          </a:xfrm>
+          <a:prstGeom prst="rect">
+            <a:avLst/>
+          </a:prstGeom>
+          <a:solidFill>
+            <a:schemeClr val="accent1"/>
+          </a:solidFill>
+        </p:spPr>
+        <p:txBody>
+          <a:bodyPr wrap="square" rtlCol="0">
+            <a:spAutoFit/>
+          </a:bodyPr>
+          <a:lstStyle/>
+          <a:p>
+            <a:r>
+              <a:rPr lang="en-US" sz="2000" b="1" dirty="0">
+                <a:solidFill>
+                  <a:schemeClr val="bg1"/>
+                </a:solidFill>
+                <a:latin typeface="+mj-lt"/>
+                <a:ea typeface="+mj-ea"/>
+                <a:cs typeface="+mj-cs"/>
+              </a:rPr>
+              <a:t>LinkedIn: </a:t>
+            </a:r>
+            <a:r>
+              <a:rPr lang="en-US" sz="2000" dirty="0">
+                <a:solidFill>
+                  <a:schemeClr val="bg1"/>
+                </a:solidFill>
+                <a:hlinkClick r:id="rId4">
+                  <a:extLst>
+                    <a:ext uri="{A12FA001-AC4F-418D-AE19-62706E023703}">
+                      <ahyp:hlinkClr xmlns:ahyp="http://schemas.microsoft.com/office/drawing/2018/hyperlinkcolor" val="tx"/>
+                    </a:ext>
+                  </a:extLst>
+                </a:hlinkClick>
+              </a:rPr>
+              <a:t>https://www.linkedin.com/in/sharonda-pettiett-8975693b/</a:t>
+            </a:r>
+            <a:endParaRPr lang="en-US" sz="2000" b="1" dirty="0">
+              <a:solidFill>
+                <a:schemeClr val="bg1"/>
+              </a:solidFill>
+              <a:latin typeface="+mj-lt"/>
+              <a:ea typeface="+mj-ea"/>
+              <a:cs typeface="+mj-cs"/>
+            </a:endParaRPr>
+          </a:p>
+        </p:txBody>
+      </p:sp>
+      <p:sp>
+        <p:nvSpPr>
+          <p:cNvPr id="8" name="TextBox 7">
+            <a:extLst>
+              <a:ext uri="{FF2B5EF4-FFF2-40B4-BE49-F238E27FC236}">
+                <a16:creationId xmlns:a16="http://schemas.microsoft.com/office/drawing/2014/main" id="{5207804A-CEB6-438F-B63F-2567AE1D6198}"/>
+              </a:ext>
+            </a:extLst>
+          </p:cNvPr>
+          <p:cNvSpPr txBox="1"/>
+          <p:nvPr/>
+        </p:nvSpPr>
+        <p:spPr>
+          <a:xfrm>
+            <a:off x="631165" y="6013740"/>
+            <a:ext cx="7881670" cy="369332"/>
+          </a:xfrm>
+          <a:prstGeom prst="rect">
+            <a:avLst/>
+          </a:prstGeom>
+          <a:solidFill>
+            <a:schemeClr val="accent1"/>
+          </a:solidFill>
+        </p:spPr>
+        <p:txBody>
+          <a:bodyPr wrap="square" rtlCol="0">
+            <a:spAutoFit/>
+          </a:bodyPr>
+          <a:lstStyle/>
+          <a:p>
+            <a:pPr algn="l"/>
+            <a:r>
+              <a:rPr lang="en-US" sz="2000" b="1" dirty="0" err="1">
+                <a:solidFill>
+                  <a:schemeClr val="bg1"/>
+                </a:solidFill>
+                <a:latin typeface="+mj-lt"/>
+                <a:ea typeface="+mj-ea"/>
+                <a:cs typeface="+mj-cs"/>
+              </a:rPr>
+              <a:t>Github</a:t>
+            </a:r>
+            <a:r>
+              <a:rPr lang="en-US" sz="2000" b="1" dirty="0">
+                <a:solidFill>
+                  <a:schemeClr val="bg1"/>
+                </a:solidFill>
+                <a:latin typeface="+mj-lt"/>
+                <a:ea typeface="+mj-ea"/>
+                <a:cs typeface="+mj-cs"/>
+              </a:rPr>
+              <a:t>: </a:t>
+            </a:r>
+            <a:r>
+              <a:rPr lang="en-US" sz="2000" dirty="0">
+                <a:solidFill>
+                  <a:schemeClr val="bg1"/>
+                </a:solidFill>
+              </a:rPr>
+              <a:t>TBD</a:t>
+            </a:r>
+            <a:endParaRPr lang="en-US" sz="2000" b="1" dirty="0">
+              <a:solidFill>
+                <a:schemeClr val="bg1"/>
+              </a:solidFill>
+              <a:latin typeface="+mj-lt"/>
+              <a:ea typeface="+mj-ea"/>
+              <a:cs typeface="+mj-cs"/>
+            </a:endParaRPr>
           </a:p>
         </p:txBody>
       </p:sp>
@@ -10341,15 +11769,19 @@
             <a:pPr lvl="1"/>
             <a:r>
               <a:rPr lang="en-US" sz="2400" dirty="0"/>
+              <a:t>Data Visualization</a:t>
+            </a:r>
+          </a:p>
+          <a:p>
+            <a:pPr lvl="1"/>
+            <a:r>
+              <a:rPr lang="en-US" sz="2400" dirty="0"/>
               <a:t>Time Series</a:t>
             </a:r>
           </a:p>
           <a:p>
             <a:pPr lvl="1"/>
-            <a:r>
-              <a:rPr lang="en-US" sz="2400" dirty="0"/>
-              <a:t>Data Visualization</a:t>
-            </a:r>
+            <a:endParaRPr lang="en-US" sz="2400" dirty="0"/>
           </a:p>
           <a:p>
             <a:pPr marL="344487" lvl="2" indent="0">
@@ -10398,219 +11830,6 @@
           <a:noFill/>
         </p:spPr>
       </p:pic>
-      <p:sp>
-        <p:nvSpPr>
-          <p:cNvPr id="8" name="Rectangle 3">
-            <a:extLst>
-              <a:ext uri="{FF2B5EF4-FFF2-40B4-BE49-F238E27FC236}">
-                <a16:creationId xmlns:a16="http://schemas.microsoft.com/office/drawing/2014/main" id="{6456DF3B-E026-4359-BB44-C50F7DE0582A}"/>
-              </a:ext>
-            </a:extLst>
-          </p:cNvPr>
-          <p:cNvSpPr txBox="1">
-            <a:spLocks noChangeArrowheads="1"/>
-          </p:cNvSpPr>
-          <p:nvPr/>
-        </p:nvSpPr>
-        <p:spPr bwMode="auto">
-          <a:xfrm>
-            <a:off x="154237" y="5827925"/>
-            <a:ext cx="8802476" cy="692226"/>
-          </a:xfrm>
-          <a:prstGeom prst="rect">
-            <a:avLst/>
-          </a:prstGeom>
-          <a:noFill/>
-          <a:ln w="9525">
-            <a:noFill/>
-            <a:miter lim="800000"/>
-            <a:headEnd/>
-            <a:tailEnd/>
-          </a:ln>
-        </p:spPr>
-        <p:txBody>
-          <a:bodyPr vert="horz" wrap="square" lIns="0" tIns="0" rIns="0" bIns="0" numCol="1" anchor="t" anchorCtr="0" compatLnSpc="1">
-            <a:prstTxWarp prst="textNoShape">
-              <a:avLst/>
-            </a:prstTxWarp>
-            <a:normAutofit/>
-          </a:bodyPr>
-          <a:lstStyle>
-            <a:lvl1pPr marL="227013" indent="-227013" algn="l" rtl="0" eaLnBrk="0" fontAlgn="base" hangingPunct="0">
-              <a:spcBef>
-                <a:spcPct val="20000"/>
-              </a:spcBef>
-              <a:spcAft>
-                <a:spcPct val="0"/>
-              </a:spcAft>
-              <a:buClr>
-                <a:schemeClr val="accent1"/>
-              </a:buClr>
-              <a:buChar char="•"/>
-              <a:defRPr sz="2400">
-                <a:solidFill>
-                  <a:schemeClr val="tx1"/>
-                </a:solidFill>
-                <a:latin typeface="+mn-lt"/>
-                <a:ea typeface="+mn-ea"/>
-                <a:cs typeface="+mn-cs"/>
-              </a:defRPr>
-            </a:lvl1pPr>
-            <a:lvl2pPr marL="569913" indent="-228600" algn="l" rtl="0" eaLnBrk="0" fontAlgn="base" hangingPunct="0">
-              <a:spcBef>
-                <a:spcPct val="20000"/>
-              </a:spcBef>
-              <a:spcAft>
-                <a:spcPct val="0"/>
-              </a:spcAft>
-              <a:buClr>
-                <a:schemeClr val="accent1"/>
-              </a:buClr>
-              <a:buChar char="•"/>
-              <a:defRPr sz="2000">
-                <a:solidFill>
-                  <a:schemeClr val="tx1"/>
-                </a:solidFill>
-                <a:latin typeface="+mn-lt"/>
-              </a:defRPr>
-            </a:lvl2pPr>
-            <a:lvl3pPr marL="914400" indent="-230188" algn="l" rtl="0" eaLnBrk="0" fontAlgn="base" hangingPunct="0">
-              <a:spcBef>
-                <a:spcPct val="20000"/>
-              </a:spcBef>
-              <a:spcAft>
-                <a:spcPct val="0"/>
-              </a:spcAft>
-              <a:buClr>
-                <a:schemeClr val="accent1"/>
-              </a:buClr>
-              <a:buChar char="•"/>
-              <a:defRPr sz="2000">
-                <a:solidFill>
-                  <a:schemeClr val="tx1"/>
-                </a:solidFill>
-                <a:latin typeface="+mn-lt"/>
-              </a:defRPr>
-            </a:lvl3pPr>
-            <a:lvl4pPr marL="1258888" indent="-230188" algn="l" rtl="0" eaLnBrk="0" fontAlgn="base" hangingPunct="0">
-              <a:spcBef>
-                <a:spcPct val="20000"/>
-              </a:spcBef>
-              <a:spcAft>
-                <a:spcPct val="0"/>
-              </a:spcAft>
-              <a:buClr>
-                <a:schemeClr val="accent1"/>
-              </a:buClr>
-              <a:buChar char="•"/>
-              <a:defRPr sz="2000">
-                <a:solidFill>
-                  <a:schemeClr val="tx1"/>
-                </a:solidFill>
-                <a:latin typeface="+mn-lt"/>
-              </a:defRPr>
-            </a:lvl4pPr>
-            <a:lvl5pPr marL="1601788" indent="-228600" algn="l" rtl="0" eaLnBrk="0" fontAlgn="base" hangingPunct="0">
-              <a:spcBef>
-                <a:spcPct val="20000"/>
-              </a:spcBef>
-              <a:spcAft>
-                <a:spcPct val="0"/>
-              </a:spcAft>
-              <a:buClr>
-                <a:schemeClr val="accent1"/>
-              </a:buClr>
-              <a:buChar char="•"/>
-              <a:defRPr sz="2000">
-                <a:solidFill>
-                  <a:schemeClr val="tx1"/>
-                </a:solidFill>
-                <a:latin typeface="+mn-lt"/>
-              </a:defRPr>
-            </a:lvl5pPr>
-            <a:lvl6pPr marL="2058988" indent="-228600" algn="l" rtl="0" fontAlgn="base">
-              <a:spcBef>
-                <a:spcPct val="20000"/>
-              </a:spcBef>
-              <a:spcAft>
-                <a:spcPct val="0"/>
-              </a:spcAft>
-              <a:buClr>
-                <a:schemeClr val="accent1"/>
-              </a:buClr>
-              <a:buChar char="•"/>
-              <a:defRPr sz="2000">
-                <a:solidFill>
-                  <a:schemeClr val="tx1"/>
-                </a:solidFill>
-                <a:latin typeface="+mn-lt"/>
-              </a:defRPr>
-            </a:lvl6pPr>
-            <a:lvl7pPr marL="2516188" indent="-228600" algn="l" rtl="0" fontAlgn="base">
-              <a:spcBef>
-                <a:spcPct val="20000"/>
-              </a:spcBef>
-              <a:spcAft>
-                <a:spcPct val="0"/>
-              </a:spcAft>
-              <a:buClr>
-                <a:schemeClr val="accent1"/>
-              </a:buClr>
-              <a:buChar char="•"/>
-              <a:defRPr sz="2000">
-                <a:solidFill>
-                  <a:schemeClr val="tx1"/>
-                </a:solidFill>
-                <a:latin typeface="+mn-lt"/>
-              </a:defRPr>
-            </a:lvl7pPr>
-            <a:lvl8pPr marL="2973388" indent="-228600" algn="l" rtl="0" fontAlgn="base">
-              <a:spcBef>
-                <a:spcPct val="20000"/>
-              </a:spcBef>
-              <a:spcAft>
-                <a:spcPct val="0"/>
-              </a:spcAft>
-              <a:buClr>
-                <a:schemeClr val="accent1"/>
-              </a:buClr>
-              <a:buChar char="•"/>
-              <a:defRPr sz="2000">
-                <a:solidFill>
-                  <a:schemeClr val="tx1"/>
-                </a:solidFill>
-                <a:latin typeface="+mn-lt"/>
-              </a:defRPr>
-            </a:lvl8pPr>
-            <a:lvl9pPr marL="3430588" indent="-228600" algn="l" rtl="0" fontAlgn="base">
-              <a:spcBef>
-                <a:spcPct val="20000"/>
-              </a:spcBef>
-              <a:spcAft>
-                <a:spcPct val="0"/>
-              </a:spcAft>
-              <a:buClr>
-                <a:schemeClr val="accent1"/>
-              </a:buClr>
-              <a:buChar char="•"/>
-              <a:defRPr sz="2000">
-                <a:solidFill>
-                  <a:schemeClr val="tx1"/>
-                </a:solidFill>
-                <a:latin typeface="+mn-lt"/>
-              </a:defRPr>
-            </a:lvl9pPr>
-          </a:lstStyle>
-          <a:p>
-            <a:pPr>
-              <a:lnSpc>
-                <a:spcPct val="100000"/>
-              </a:lnSpc>
-            </a:pPr>
-            <a:endParaRPr lang="en-US" sz="2200" kern="0" dirty="0"/>
-          </a:p>
-        </p:txBody>
-      </p:sp>
     </p:spTree>
   </p:cSld>
   <p:clrMapOvr>
@@ -11079,7 +12298,7 @@
             </a:pPr>
             <a:r>
               <a:rPr lang="en-US" sz="2400" dirty="0"/>
-              <a:t>Revenue lost from cancellations per year</a:t>
+              <a:t>Average lost from cancellations per year</a:t>
             </a:r>
           </a:p>
           <a:p>
@@ -11315,7 +12534,7 @@
         </p:blipFill>
         <p:spPr>
           <a:xfrm>
-            <a:off x="4484036" y="3695307"/>
+            <a:off x="4518939" y="3870444"/>
             <a:ext cx="2634439" cy="1852340"/>
           </a:xfrm>
           <a:prstGeom prst="rect">
@@ -11351,8 +12570,44 @@
         </p:blipFill>
         <p:spPr>
           <a:xfrm>
-            <a:off x="6396840" y="5170263"/>
-            <a:ext cx="1443270" cy="836854"/>
+            <a:off x="6765362" y="4785981"/>
+            <a:ext cx="1386050" cy="803676"/>
+          </a:xfrm>
+          <a:prstGeom prst="rect">
+            <a:avLst/>
+          </a:prstGeom>
+        </p:spPr>
+      </p:pic>
+      <p:pic>
+        <p:nvPicPr>
+          <p:cNvPr id="15" name="Picture 14" descr="A picture containing drawing&#10;&#10;Description automatically generated">
+            <a:extLst>
+              <a:ext uri="{FF2B5EF4-FFF2-40B4-BE49-F238E27FC236}">
+                <a16:creationId xmlns:a16="http://schemas.microsoft.com/office/drawing/2014/main" id="{04D06453-0090-4774-BF0D-B8BC2642B9C9}"/>
+              </a:ext>
+            </a:extLst>
+          </p:cNvPr>
+          <p:cNvPicPr>
+            <a:picLocks noChangeAspect="1"/>
+          </p:cNvPicPr>
+          <p:nvPr/>
+        </p:nvPicPr>
+        <p:blipFill>
+          <a:blip r:embed="rId6" cstate="print">
+            <a:extLst>
+              <a:ext uri="{28A0092B-C50C-407E-A947-70E740481C1C}">
+                <a14:useLocalDpi xmlns:a14="http://schemas.microsoft.com/office/drawing/2010/main" val="0"/>
+              </a:ext>
+            </a:extLst>
+          </a:blip>
+          <a:stretch>
+            <a:fillRect/>
+          </a:stretch>
+        </p:blipFill>
+        <p:spPr>
+          <a:xfrm>
+            <a:off x="8292494" y="4889047"/>
+            <a:ext cx="488896" cy="558739"/>
           </a:xfrm>
           <a:prstGeom prst="rect">
             <a:avLst/>
@@ -11362,13 +12617,16 @@
     </p:spTree>
     <p:extLst>
       <p:ext uri="{BB962C8B-B14F-4D97-AF65-F5344CB8AC3E}">
-        <p14:creationId xmlns:p14="http://schemas.microsoft.com/office/powerpoint/2010/main" val="2373055"/>
+        <p14:creationId xmlns:p14="http://schemas.microsoft.com/office/powerpoint/2010/main" val="482109865"/>
       </p:ext>
     </p:extLst>
   </p:cSld>
   <p:clrMapOvr>
     <a:masterClrMapping/>
   </p:clrMapOvr>
+  <p:transition>
+    <p:wipe dir="r"/>
+  </p:transition>
 </p:sld>
 </file>
 

</xml_diff>